<commit_message>
setted ball size responsive
</commit_message>
<xml_diff>
--- a/res/size_specification.pptx
+++ b/res/size_specification.pptx
@@ -2,7 +2,7 @@
 <file path=ppt/presentation.xml><?xml version="1.0" encoding="utf-8"?>
 <p:presentation xmlns:a="http://schemas.openxmlformats.org/drawingml/2006/main" xmlns:r="http://schemas.openxmlformats.org/officeDocument/2006/relationships" xmlns:p="http://schemas.openxmlformats.org/presentationml/2006/main" saveSubsetFonts="1">
   <p:sldMasterIdLst>
-    <p:sldMasterId id="2147483648" r:id="rId1"/>
+    <p:sldMasterId id="2147483660" r:id="rId1"/>
   </p:sldMasterIdLst>
   <p:notesMasterIdLst>
     <p:notesMasterId r:id="rId4"/>
@@ -11,13 +11,13 @@
     <p:sldId id="256" r:id="rId2"/>
     <p:sldId id="257" r:id="rId3"/>
   </p:sldIdLst>
-  <p:sldSz cx="12192000" cy="6858000"/>
+  <p:sldSz cx="6858000" cy="12192000"/>
   <p:notesSz cx="6858000" cy="9144000"/>
   <p:defaultTextStyle>
     <a:defPPr>
       <a:defRPr lang="en-US"/>
     </a:defPPr>
-    <a:lvl1pPr marL="0" algn="l" defTabSz="914400" rtl="0" eaLnBrk="1" latinLnBrk="0" hangingPunct="1">
+    <a:lvl1pPr marL="0" algn="l" defTabSz="457200" rtl="0" eaLnBrk="1" latinLnBrk="0" hangingPunct="1">
       <a:defRPr sz="1800" kern="1200">
         <a:solidFill>
           <a:schemeClr val="tx1"/>
@@ -27,7 +27,7 @@
         <a:cs typeface="+mn-cs"/>
       </a:defRPr>
     </a:lvl1pPr>
-    <a:lvl2pPr marL="457200" algn="l" defTabSz="914400" rtl="0" eaLnBrk="1" latinLnBrk="0" hangingPunct="1">
+    <a:lvl2pPr marL="457200" algn="l" defTabSz="457200" rtl="0" eaLnBrk="1" latinLnBrk="0" hangingPunct="1">
       <a:defRPr sz="1800" kern="1200">
         <a:solidFill>
           <a:schemeClr val="tx1"/>
@@ -37,7 +37,7 @@
         <a:cs typeface="+mn-cs"/>
       </a:defRPr>
     </a:lvl2pPr>
-    <a:lvl3pPr marL="914400" algn="l" defTabSz="914400" rtl="0" eaLnBrk="1" latinLnBrk="0" hangingPunct="1">
+    <a:lvl3pPr marL="914400" algn="l" defTabSz="457200" rtl="0" eaLnBrk="1" latinLnBrk="0" hangingPunct="1">
       <a:defRPr sz="1800" kern="1200">
         <a:solidFill>
           <a:schemeClr val="tx1"/>
@@ -47,7 +47,7 @@
         <a:cs typeface="+mn-cs"/>
       </a:defRPr>
     </a:lvl3pPr>
-    <a:lvl4pPr marL="1371600" algn="l" defTabSz="914400" rtl="0" eaLnBrk="1" latinLnBrk="0" hangingPunct="1">
+    <a:lvl4pPr marL="1371600" algn="l" defTabSz="457200" rtl="0" eaLnBrk="1" latinLnBrk="0" hangingPunct="1">
       <a:defRPr sz="1800" kern="1200">
         <a:solidFill>
           <a:schemeClr val="tx1"/>
@@ -57,7 +57,7 @@
         <a:cs typeface="+mn-cs"/>
       </a:defRPr>
     </a:lvl4pPr>
-    <a:lvl5pPr marL="1828800" algn="l" defTabSz="914400" rtl="0" eaLnBrk="1" latinLnBrk="0" hangingPunct="1">
+    <a:lvl5pPr marL="1828800" algn="l" defTabSz="457200" rtl="0" eaLnBrk="1" latinLnBrk="0" hangingPunct="1">
       <a:defRPr sz="1800" kern="1200">
         <a:solidFill>
           <a:schemeClr val="tx1"/>
@@ -67,7 +67,7 @@
         <a:cs typeface="+mn-cs"/>
       </a:defRPr>
     </a:lvl5pPr>
-    <a:lvl6pPr marL="2286000" algn="l" defTabSz="914400" rtl="0" eaLnBrk="1" latinLnBrk="0" hangingPunct="1">
+    <a:lvl6pPr marL="2286000" algn="l" defTabSz="457200" rtl="0" eaLnBrk="1" latinLnBrk="0" hangingPunct="1">
       <a:defRPr sz="1800" kern="1200">
         <a:solidFill>
           <a:schemeClr val="tx1"/>
@@ -77,7 +77,7 @@
         <a:cs typeface="+mn-cs"/>
       </a:defRPr>
     </a:lvl6pPr>
-    <a:lvl7pPr marL="2743200" algn="l" defTabSz="914400" rtl="0" eaLnBrk="1" latinLnBrk="0" hangingPunct="1">
+    <a:lvl7pPr marL="2743200" algn="l" defTabSz="457200" rtl="0" eaLnBrk="1" latinLnBrk="0" hangingPunct="1">
       <a:defRPr sz="1800" kern="1200">
         <a:solidFill>
           <a:schemeClr val="tx1"/>
@@ -87,7 +87,7 @@
         <a:cs typeface="+mn-cs"/>
       </a:defRPr>
     </a:lvl7pPr>
-    <a:lvl8pPr marL="3200400" algn="l" defTabSz="914400" rtl="0" eaLnBrk="1" latinLnBrk="0" hangingPunct="1">
+    <a:lvl8pPr marL="3200400" algn="l" defTabSz="457200" rtl="0" eaLnBrk="1" latinLnBrk="0" hangingPunct="1">
       <a:defRPr sz="1800" kern="1200">
         <a:solidFill>
           <a:schemeClr val="tx1"/>
@@ -97,7 +97,7 @@
         <a:cs typeface="+mn-cs"/>
       </a:defRPr>
     </a:lvl8pPr>
-    <a:lvl9pPr marL="3657600" algn="l" defTabSz="914400" rtl="0" eaLnBrk="1" latinLnBrk="0" hangingPunct="1">
+    <a:lvl9pPr marL="3657600" algn="l" defTabSz="457200" rtl="0" eaLnBrk="1" latinLnBrk="0" hangingPunct="1">
       <a:defRPr sz="1800" kern="1200">
         <a:solidFill>
           <a:schemeClr val="tx1"/>
@@ -108,6 +108,11 @@
       </a:defRPr>
     </a:lvl9pPr>
   </p:defaultTextStyle>
+  <p:extLst>
+    <p:ext uri="{EFAFB233-063F-42B5-8137-9DF3F51BA10A}">
+      <p15:sldGuideLst xmlns:p15="http://schemas.microsoft.com/office/powerpoint/2012/main"/>
+    </p:ext>
+  </p:extLst>
 </p:presentation>
 </file>
 
@@ -193,7 +198,7 @@
           <a:p>
             <a:fld id="{78A35E23-D501-4D24-8C55-302DE738A9D6}" type="datetimeFigureOut">
               <a:rPr lang="en-GB" smtClean="0"/>
-              <a:t>11/11/2022</a:t>
+              <a:t>14/11/2022</a:t>
             </a:fld>
             <a:endParaRPr lang="en-GB"/>
           </a:p>
@@ -211,8 +216,8 @@
         </p:nvSpPr>
         <p:spPr>
           <a:xfrm>
-            <a:off x="685800" y="1143000"/>
-            <a:ext cx="5486400" cy="3086100"/>
+            <a:off x="2560638" y="1143000"/>
+            <a:ext cx="1736725" cy="3086100"/>
           </a:xfrm>
           <a:prstGeom prst="rect">
             <a:avLst/>
@@ -488,7 +493,12 @@
             <p:ph type="sldImg"/>
           </p:nvPr>
         </p:nvSpPr>
-        <p:spPr/>
+        <p:spPr>
+          <a:xfrm>
+            <a:off x="2560638" y="1143000"/>
+            <a:ext cx="1736725" cy="3086100"/>
+          </a:xfrm>
+        </p:spPr>
       </p:sp>
       <p:sp>
         <p:nvSpPr>
@@ -575,7 +585,12 @@
             <p:ph type="sldImg"/>
           </p:nvPr>
         </p:nvSpPr>
-        <p:spPr/>
+        <p:spPr>
+          <a:xfrm>
+            <a:off x="2560638" y="1143000"/>
+            <a:ext cx="1736725" cy="3086100"/>
+          </a:xfrm>
+        </p:spPr>
       </p:sp>
       <p:sp>
         <p:nvSpPr>
@@ -654,13 +669,7 @@
       </p:grpSpPr>
       <p:sp>
         <p:nvSpPr>
-          <p:cNvPr id="2" name="Title 1">
-            <a:extLst>
-              <a:ext uri="{FF2B5EF4-FFF2-40B4-BE49-F238E27FC236}">
-                <a16:creationId xmlns:a16="http://schemas.microsoft.com/office/drawing/2014/main" id="{2AAD1704-51C8-3DE0-4EA3-746E39814CF9}"/>
-              </a:ext>
-            </a:extLst>
-          </p:cNvPr>
+          <p:cNvPr id="2" name="Title 1"/>
           <p:cNvSpPr>
             <a:spLocks noGrp="1"/>
           </p:cNvSpPr>
@@ -670,15 +679,15 @@
         </p:nvSpPr>
         <p:spPr>
           <a:xfrm>
-            <a:off x="1524000" y="1122363"/>
-            <a:ext cx="9144000" cy="2387600"/>
+            <a:off x="514350" y="1995312"/>
+            <a:ext cx="5829300" cy="4244622"/>
           </a:xfrm>
         </p:spPr>
         <p:txBody>
           <a:bodyPr anchor="b"/>
           <a:lstStyle>
             <a:lvl1pPr algn="ctr">
-              <a:defRPr sz="6000"/>
+              <a:defRPr sz="4500"/>
             </a:lvl1pPr>
           </a:lstStyle>
           <a:p>
@@ -686,19 +695,13 @@
               <a:rPr lang="en-US"/>
               <a:t>Click to edit Master title style</a:t>
             </a:r>
-            <a:endParaRPr lang="en-GB"/>
-          </a:p>
-        </p:txBody>
-      </p:sp>
-      <p:sp>
-        <p:nvSpPr>
-          <p:cNvPr id="3" name="Subtitle 2">
-            <a:extLst>
-              <a:ext uri="{FF2B5EF4-FFF2-40B4-BE49-F238E27FC236}">
-                <a16:creationId xmlns:a16="http://schemas.microsoft.com/office/drawing/2014/main" id="{AFB0FEE3-D742-D7D2-36B4-F60C9F38CD28}"/>
-              </a:ext>
-            </a:extLst>
-          </p:cNvPr>
+            <a:endParaRPr lang="en-US" dirty="0"/>
+          </a:p>
+        </p:txBody>
+      </p:sp>
+      <p:sp>
+        <p:nvSpPr>
+          <p:cNvPr id="3" name="Subtitle 2"/>
           <p:cNvSpPr>
             <a:spLocks noGrp="1"/>
           </p:cNvSpPr>
@@ -708,8 +711,8 @@
         </p:nvSpPr>
         <p:spPr>
           <a:xfrm>
-            <a:off x="1524000" y="3602038"/>
-            <a:ext cx="9144000" cy="1655762"/>
+            <a:off x="857250" y="6403623"/>
+            <a:ext cx="5143500" cy="2943577"/>
           </a:xfrm>
         </p:spPr>
         <p:txBody>
@@ -717,39 +720,39 @@
           <a:lstStyle>
             <a:lvl1pPr marL="0" indent="0" algn="ctr">
               <a:buNone/>
-              <a:defRPr sz="2400"/>
+              <a:defRPr sz="1800"/>
             </a:lvl1pPr>
-            <a:lvl2pPr marL="457200" indent="0" algn="ctr">
-              <a:buNone/>
-              <a:defRPr sz="2000"/>
+            <a:lvl2pPr marL="342900" indent="0" algn="ctr">
+              <a:buNone/>
+              <a:defRPr sz="1500"/>
             </a:lvl2pPr>
-            <a:lvl3pPr marL="914400" indent="0" algn="ctr">
-              <a:buNone/>
-              <a:defRPr sz="1800"/>
+            <a:lvl3pPr marL="685800" indent="0" algn="ctr">
+              <a:buNone/>
+              <a:defRPr sz="1350"/>
             </a:lvl3pPr>
-            <a:lvl4pPr marL="1371600" indent="0" algn="ctr">
-              <a:buNone/>
-              <a:defRPr sz="1600"/>
+            <a:lvl4pPr marL="1028700" indent="0" algn="ctr">
+              <a:buNone/>
+              <a:defRPr sz="1200"/>
             </a:lvl4pPr>
-            <a:lvl5pPr marL="1828800" indent="0" algn="ctr">
-              <a:buNone/>
-              <a:defRPr sz="1600"/>
+            <a:lvl5pPr marL="1371600" indent="0" algn="ctr">
+              <a:buNone/>
+              <a:defRPr sz="1200"/>
             </a:lvl5pPr>
-            <a:lvl6pPr marL="2286000" indent="0" algn="ctr">
-              <a:buNone/>
-              <a:defRPr sz="1600"/>
+            <a:lvl6pPr marL="1714500" indent="0" algn="ctr">
+              <a:buNone/>
+              <a:defRPr sz="1200"/>
             </a:lvl6pPr>
-            <a:lvl7pPr marL="2743200" indent="0" algn="ctr">
-              <a:buNone/>
-              <a:defRPr sz="1600"/>
+            <a:lvl7pPr marL="2057400" indent="0" algn="ctr">
+              <a:buNone/>
+              <a:defRPr sz="1200"/>
             </a:lvl7pPr>
-            <a:lvl8pPr marL="3200400" indent="0" algn="ctr">
-              <a:buNone/>
-              <a:defRPr sz="1600"/>
+            <a:lvl8pPr marL="2400300" indent="0" algn="ctr">
+              <a:buNone/>
+              <a:defRPr sz="1200"/>
             </a:lvl8pPr>
-            <a:lvl9pPr marL="3657600" indent="0" algn="ctr">
-              <a:buNone/>
-              <a:defRPr sz="1600"/>
+            <a:lvl9pPr marL="2743200" indent="0" algn="ctr">
+              <a:buNone/>
+              <a:defRPr sz="1200"/>
             </a:lvl9pPr>
           </a:lstStyle>
           <a:p>
@@ -757,19 +760,13 @@
               <a:rPr lang="en-US"/>
               <a:t>Click to edit Master subtitle style</a:t>
             </a:r>
-            <a:endParaRPr lang="en-GB"/>
-          </a:p>
-        </p:txBody>
-      </p:sp>
-      <p:sp>
-        <p:nvSpPr>
-          <p:cNvPr id="4" name="Date Placeholder 3">
-            <a:extLst>
-              <a:ext uri="{FF2B5EF4-FFF2-40B4-BE49-F238E27FC236}">
-                <a16:creationId xmlns:a16="http://schemas.microsoft.com/office/drawing/2014/main" id="{1C3740CA-1F12-1BB9-5701-7875E5ECEA70}"/>
-              </a:ext>
-            </a:extLst>
-          </p:cNvPr>
+            <a:endParaRPr lang="en-US" dirty="0"/>
+          </a:p>
+        </p:txBody>
+      </p:sp>
+      <p:sp>
+        <p:nvSpPr>
+          <p:cNvPr id="4" name="Date Placeholder 3"/>
           <p:cNvSpPr>
             <a:spLocks noGrp="1"/>
           </p:cNvSpPr>
@@ -784,7 +781,7 @@
           <a:p>
             <a:fld id="{780C652B-FE7E-4554-84A2-6BDBCA1E2D75}" type="datetimeFigureOut">
               <a:rPr lang="en-GB" smtClean="0"/>
-              <a:t>11/11/2022</a:t>
+              <a:t>14/11/2022</a:t>
             </a:fld>
             <a:endParaRPr lang="en-GB"/>
           </a:p>
@@ -792,13 +789,7 @@
       </p:sp>
       <p:sp>
         <p:nvSpPr>
-          <p:cNvPr id="5" name="Footer Placeholder 4">
-            <a:extLst>
-              <a:ext uri="{FF2B5EF4-FFF2-40B4-BE49-F238E27FC236}">
-                <a16:creationId xmlns:a16="http://schemas.microsoft.com/office/drawing/2014/main" id="{C9AB6468-B90E-B01B-2B7E-817410680323}"/>
-              </a:ext>
-            </a:extLst>
-          </p:cNvPr>
+          <p:cNvPr id="5" name="Footer Placeholder 4"/>
           <p:cNvSpPr>
             <a:spLocks noGrp="1"/>
           </p:cNvSpPr>
@@ -817,13 +808,7 @@
       </p:sp>
       <p:sp>
         <p:nvSpPr>
-          <p:cNvPr id="6" name="Slide Number Placeholder 5">
-            <a:extLst>
-              <a:ext uri="{FF2B5EF4-FFF2-40B4-BE49-F238E27FC236}">
-                <a16:creationId xmlns:a16="http://schemas.microsoft.com/office/drawing/2014/main" id="{105EF1AF-4097-CE27-AE38-F84124801910}"/>
-              </a:ext>
-            </a:extLst>
-          </p:cNvPr>
+          <p:cNvPr id="6" name="Slide Number Placeholder 5"/>
           <p:cNvSpPr>
             <a:spLocks noGrp="1"/>
           </p:cNvSpPr>
@@ -847,7 +832,7 @@
     </p:spTree>
     <p:extLst>
       <p:ext uri="{BB962C8B-B14F-4D97-AF65-F5344CB8AC3E}">
-        <p14:creationId xmlns:p14="http://schemas.microsoft.com/office/powerpoint/2010/main" val="2643904352"/>
+        <p14:creationId xmlns:p14="http://schemas.microsoft.com/office/powerpoint/2010/main" val="3879191542"/>
       </p:ext>
     </p:extLst>
   </p:cSld>
@@ -876,13 +861,7 @@
       </p:grpSpPr>
       <p:sp>
         <p:nvSpPr>
-          <p:cNvPr id="2" name="Title 1">
-            <a:extLst>
-              <a:ext uri="{FF2B5EF4-FFF2-40B4-BE49-F238E27FC236}">
-                <a16:creationId xmlns:a16="http://schemas.microsoft.com/office/drawing/2014/main" id="{45CD9566-2CDF-F82A-FF9B-268C4CEDD374}"/>
-              </a:ext>
-            </a:extLst>
-          </p:cNvPr>
+          <p:cNvPr id="2" name="Title 1"/>
           <p:cNvSpPr>
             <a:spLocks noGrp="1"/>
           </p:cNvSpPr>
@@ -899,19 +878,13 @@
               <a:rPr lang="en-US"/>
               <a:t>Click to edit Master title style</a:t>
             </a:r>
-            <a:endParaRPr lang="en-GB"/>
-          </a:p>
-        </p:txBody>
-      </p:sp>
-      <p:sp>
-        <p:nvSpPr>
-          <p:cNvPr id="3" name="Vertical Text Placeholder 2">
-            <a:extLst>
-              <a:ext uri="{FF2B5EF4-FFF2-40B4-BE49-F238E27FC236}">
-                <a16:creationId xmlns:a16="http://schemas.microsoft.com/office/drawing/2014/main" id="{6D6D56AC-BE37-6BBF-4236-1835919668AA}"/>
-              </a:ext>
-            </a:extLst>
-          </p:cNvPr>
+            <a:endParaRPr lang="en-US" dirty="0"/>
+          </a:p>
+        </p:txBody>
+      </p:sp>
+      <p:sp>
+        <p:nvSpPr>
+          <p:cNvPr id="3" name="Vertical Text Placeholder 2"/>
           <p:cNvSpPr>
             <a:spLocks noGrp="1"/>
           </p:cNvSpPr>
@@ -957,19 +930,13 @@
               <a:rPr lang="en-US"/>
               <a:t>Fifth level</a:t>
             </a:r>
-            <a:endParaRPr lang="en-GB"/>
-          </a:p>
-        </p:txBody>
-      </p:sp>
-      <p:sp>
-        <p:nvSpPr>
-          <p:cNvPr id="4" name="Date Placeholder 3">
-            <a:extLst>
-              <a:ext uri="{FF2B5EF4-FFF2-40B4-BE49-F238E27FC236}">
-                <a16:creationId xmlns:a16="http://schemas.microsoft.com/office/drawing/2014/main" id="{82A78763-5D2E-4F95-0C72-2F4CA930279D}"/>
-              </a:ext>
-            </a:extLst>
-          </p:cNvPr>
+            <a:endParaRPr lang="en-US" dirty="0"/>
+          </a:p>
+        </p:txBody>
+      </p:sp>
+      <p:sp>
+        <p:nvSpPr>
+          <p:cNvPr id="4" name="Date Placeholder 3"/>
           <p:cNvSpPr>
             <a:spLocks noGrp="1"/>
           </p:cNvSpPr>
@@ -984,7 +951,7 @@
           <a:p>
             <a:fld id="{780C652B-FE7E-4554-84A2-6BDBCA1E2D75}" type="datetimeFigureOut">
               <a:rPr lang="en-GB" smtClean="0"/>
-              <a:t>11/11/2022</a:t>
+              <a:t>14/11/2022</a:t>
             </a:fld>
             <a:endParaRPr lang="en-GB"/>
           </a:p>
@@ -992,13 +959,7 @@
       </p:sp>
       <p:sp>
         <p:nvSpPr>
-          <p:cNvPr id="5" name="Footer Placeholder 4">
-            <a:extLst>
-              <a:ext uri="{FF2B5EF4-FFF2-40B4-BE49-F238E27FC236}">
-                <a16:creationId xmlns:a16="http://schemas.microsoft.com/office/drawing/2014/main" id="{25C6B525-B158-1F07-F22C-6869DDD761B3}"/>
-              </a:ext>
-            </a:extLst>
-          </p:cNvPr>
+          <p:cNvPr id="5" name="Footer Placeholder 4"/>
           <p:cNvSpPr>
             <a:spLocks noGrp="1"/>
           </p:cNvSpPr>
@@ -1017,13 +978,7 @@
       </p:sp>
       <p:sp>
         <p:nvSpPr>
-          <p:cNvPr id="6" name="Slide Number Placeholder 5">
-            <a:extLst>
-              <a:ext uri="{FF2B5EF4-FFF2-40B4-BE49-F238E27FC236}">
-                <a16:creationId xmlns:a16="http://schemas.microsoft.com/office/drawing/2014/main" id="{ADDA94FD-3690-6A6C-4516-10FC7C0B1559}"/>
-              </a:ext>
-            </a:extLst>
-          </p:cNvPr>
+          <p:cNvPr id="6" name="Slide Number Placeholder 5"/>
           <p:cNvSpPr>
             <a:spLocks noGrp="1"/>
           </p:cNvSpPr>
@@ -1047,7 +1002,7 @@
     </p:spTree>
     <p:extLst>
       <p:ext uri="{BB962C8B-B14F-4D97-AF65-F5344CB8AC3E}">
-        <p14:creationId xmlns:p14="http://schemas.microsoft.com/office/powerpoint/2010/main" val="2240150976"/>
+        <p14:creationId xmlns:p14="http://schemas.microsoft.com/office/powerpoint/2010/main" val="4038024756"/>
       </p:ext>
     </p:extLst>
   </p:cSld>
@@ -1076,13 +1031,7 @@
       </p:grpSpPr>
       <p:sp>
         <p:nvSpPr>
-          <p:cNvPr id="2" name="Vertical Title 1">
-            <a:extLst>
-              <a:ext uri="{FF2B5EF4-FFF2-40B4-BE49-F238E27FC236}">
-                <a16:creationId xmlns:a16="http://schemas.microsoft.com/office/drawing/2014/main" id="{1CB2288E-3B0D-1A44-B455-BC6B29E161AE}"/>
-              </a:ext>
-            </a:extLst>
-          </p:cNvPr>
+          <p:cNvPr id="2" name="Vertical Title 1"/>
           <p:cNvSpPr>
             <a:spLocks noGrp="1"/>
           </p:cNvSpPr>
@@ -1092,8 +1041,8 @@
         </p:nvSpPr>
         <p:spPr>
           <a:xfrm>
-            <a:off x="8724900" y="365125"/>
-            <a:ext cx="2628900" cy="5811838"/>
+            <a:off x="4907757" y="649111"/>
+            <a:ext cx="1478756" cy="10332156"/>
           </a:xfrm>
         </p:spPr>
         <p:txBody>
@@ -1104,19 +1053,13 @@
               <a:rPr lang="en-US"/>
               <a:t>Click to edit Master title style</a:t>
             </a:r>
-            <a:endParaRPr lang="en-GB"/>
-          </a:p>
-        </p:txBody>
-      </p:sp>
-      <p:sp>
-        <p:nvSpPr>
-          <p:cNvPr id="3" name="Vertical Text Placeholder 2">
-            <a:extLst>
-              <a:ext uri="{FF2B5EF4-FFF2-40B4-BE49-F238E27FC236}">
-                <a16:creationId xmlns:a16="http://schemas.microsoft.com/office/drawing/2014/main" id="{B27F0CAB-F119-FAF7-3F9C-6598BC8EAE5F}"/>
-              </a:ext>
-            </a:extLst>
-          </p:cNvPr>
+            <a:endParaRPr lang="en-US" dirty="0"/>
+          </a:p>
+        </p:txBody>
+      </p:sp>
+      <p:sp>
+        <p:nvSpPr>
+          <p:cNvPr id="3" name="Vertical Text Placeholder 2"/>
           <p:cNvSpPr>
             <a:spLocks noGrp="1"/>
           </p:cNvSpPr>
@@ -1126,8 +1069,8 @@
         </p:nvSpPr>
         <p:spPr>
           <a:xfrm>
-            <a:off x="838200" y="365125"/>
-            <a:ext cx="7734300" cy="5811838"/>
+            <a:off x="471488" y="649111"/>
+            <a:ext cx="4350544" cy="10332156"/>
           </a:xfrm>
         </p:spPr>
         <p:txBody>
@@ -1167,19 +1110,13 @@
               <a:rPr lang="en-US"/>
               <a:t>Fifth level</a:t>
             </a:r>
-            <a:endParaRPr lang="en-GB"/>
-          </a:p>
-        </p:txBody>
-      </p:sp>
-      <p:sp>
-        <p:nvSpPr>
-          <p:cNvPr id="4" name="Date Placeholder 3">
-            <a:extLst>
-              <a:ext uri="{FF2B5EF4-FFF2-40B4-BE49-F238E27FC236}">
-                <a16:creationId xmlns:a16="http://schemas.microsoft.com/office/drawing/2014/main" id="{D75FBE94-045C-407D-11D0-E090C6D3AECF}"/>
-              </a:ext>
-            </a:extLst>
-          </p:cNvPr>
+            <a:endParaRPr lang="en-US" dirty="0"/>
+          </a:p>
+        </p:txBody>
+      </p:sp>
+      <p:sp>
+        <p:nvSpPr>
+          <p:cNvPr id="4" name="Date Placeholder 3"/>
           <p:cNvSpPr>
             <a:spLocks noGrp="1"/>
           </p:cNvSpPr>
@@ -1194,7 +1131,7 @@
           <a:p>
             <a:fld id="{780C652B-FE7E-4554-84A2-6BDBCA1E2D75}" type="datetimeFigureOut">
               <a:rPr lang="en-GB" smtClean="0"/>
-              <a:t>11/11/2022</a:t>
+              <a:t>14/11/2022</a:t>
             </a:fld>
             <a:endParaRPr lang="en-GB"/>
           </a:p>
@@ -1202,13 +1139,7 @@
       </p:sp>
       <p:sp>
         <p:nvSpPr>
-          <p:cNvPr id="5" name="Footer Placeholder 4">
-            <a:extLst>
-              <a:ext uri="{FF2B5EF4-FFF2-40B4-BE49-F238E27FC236}">
-                <a16:creationId xmlns:a16="http://schemas.microsoft.com/office/drawing/2014/main" id="{1567E135-0EE0-885E-32FE-FD5653E54696}"/>
-              </a:ext>
-            </a:extLst>
-          </p:cNvPr>
+          <p:cNvPr id="5" name="Footer Placeholder 4"/>
           <p:cNvSpPr>
             <a:spLocks noGrp="1"/>
           </p:cNvSpPr>
@@ -1227,13 +1158,7 @@
       </p:sp>
       <p:sp>
         <p:nvSpPr>
-          <p:cNvPr id="6" name="Slide Number Placeholder 5">
-            <a:extLst>
-              <a:ext uri="{FF2B5EF4-FFF2-40B4-BE49-F238E27FC236}">
-                <a16:creationId xmlns:a16="http://schemas.microsoft.com/office/drawing/2014/main" id="{2F1163C4-76A5-9A28-9922-6FF4E6BD0CCC}"/>
-              </a:ext>
-            </a:extLst>
-          </p:cNvPr>
+          <p:cNvPr id="6" name="Slide Number Placeholder 5"/>
           <p:cNvSpPr>
             <a:spLocks noGrp="1"/>
           </p:cNvSpPr>
@@ -1257,7 +1182,7 @@
     </p:spTree>
     <p:extLst>
       <p:ext uri="{BB962C8B-B14F-4D97-AF65-F5344CB8AC3E}">
-        <p14:creationId xmlns:p14="http://schemas.microsoft.com/office/powerpoint/2010/main" val="3579324079"/>
+        <p14:creationId xmlns:p14="http://schemas.microsoft.com/office/powerpoint/2010/main" val="1600713283"/>
       </p:ext>
     </p:extLst>
   </p:cSld>
@@ -1286,13 +1211,7 @@
       </p:grpSpPr>
       <p:sp>
         <p:nvSpPr>
-          <p:cNvPr id="2" name="Title 1">
-            <a:extLst>
-              <a:ext uri="{FF2B5EF4-FFF2-40B4-BE49-F238E27FC236}">
-                <a16:creationId xmlns:a16="http://schemas.microsoft.com/office/drawing/2014/main" id="{73D88C41-DFC5-6D70-6918-AEFB0A999C83}"/>
-              </a:ext>
-            </a:extLst>
-          </p:cNvPr>
+          <p:cNvPr id="2" name="Title 1"/>
           <p:cNvSpPr>
             <a:spLocks noGrp="1"/>
           </p:cNvSpPr>
@@ -1309,19 +1228,13 @@
               <a:rPr lang="en-US"/>
               <a:t>Click to edit Master title style</a:t>
             </a:r>
-            <a:endParaRPr lang="en-GB"/>
-          </a:p>
-        </p:txBody>
-      </p:sp>
-      <p:sp>
-        <p:nvSpPr>
-          <p:cNvPr id="3" name="Content Placeholder 2">
-            <a:extLst>
-              <a:ext uri="{FF2B5EF4-FFF2-40B4-BE49-F238E27FC236}">
-                <a16:creationId xmlns:a16="http://schemas.microsoft.com/office/drawing/2014/main" id="{AD0B5104-2672-DF5F-EDCB-E93875FC6119}"/>
-              </a:ext>
-            </a:extLst>
-          </p:cNvPr>
+            <a:endParaRPr lang="en-US" dirty="0"/>
+          </a:p>
+        </p:txBody>
+      </p:sp>
+      <p:sp>
+        <p:nvSpPr>
+          <p:cNvPr id="3" name="Content Placeholder 2"/>
           <p:cNvSpPr>
             <a:spLocks noGrp="1"/>
           </p:cNvSpPr>
@@ -1367,19 +1280,13 @@
               <a:rPr lang="en-US"/>
               <a:t>Fifth level</a:t>
             </a:r>
-            <a:endParaRPr lang="en-GB"/>
-          </a:p>
-        </p:txBody>
-      </p:sp>
-      <p:sp>
-        <p:nvSpPr>
-          <p:cNvPr id="4" name="Date Placeholder 3">
-            <a:extLst>
-              <a:ext uri="{FF2B5EF4-FFF2-40B4-BE49-F238E27FC236}">
-                <a16:creationId xmlns:a16="http://schemas.microsoft.com/office/drawing/2014/main" id="{5C6468D6-F8C2-2A45-59EC-D393A0C1AC4D}"/>
-              </a:ext>
-            </a:extLst>
-          </p:cNvPr>
+            <a:endParaRPr lang="en-US" dirty="0"/>
+          </a:p>
+        </p:txBody>
+      </p:sp>
+      <p:sp>
+        <p:nvSpPr>
+          <p:cNvPr id="4" name="Date Placeholder 3"/>
           <p:cNvSpPr>
             <a:spLocks noGrp="1"/>
           </p:cNvSpPr>
@@ -1394,7 +1301,7 @@
           <a:p>
             <a:fld id="{780C652B-FE7E-4554-84A2-6BDBCA1E2D75}" type="datetimeFigureOut">
               <a:rPr lang="en-GB" smtClean="0"/>
-              <a:t>11/11/2022</a:t>
+              <a:t>14/11/2022</a:t>
             </a:fld>
             <a:endParaRPr lang="en-GB"/>
           </a:p>
@@ -1402,13 +1309,7 @@
       </p:sp>
       <p:sp>
         <p:nvSpPr>
-          <p:cNvPr id="5" name="Footer Placeholder 4">
-            <a:extLst>
-              <a:ext uri="{FF2B5EF4-FFF2-40B4-BE49-F238E27FC236}">
-                <a16:creationId xmlns:a16="http://schemas.microsoft.com/office/drawing/2014/main" id="{8C88CDD7-7C21-18D3-ECA7-3D005ABB8954}"/>
-              </a:ext>
-            </a:extLst>
-          </p:cNvPr>
+          <p:cNvPr id="5" name="Footer Placeholder 4"/>
           <p:cNvSpPr>
             <a:spLocks noGrp="1"/>
           </p:cNvSpPr>
@@ -1427,13 +1328,7 @@
       </p:sp>
       <p:sp>
         <p:nvSpPr>
-          <p:cNvPr id="6" name="Slide Number Placeholder 5">
-            <a:extLst>
-              <a:ext uri="{FF2B5EF4-FFF2-40B4-BE49-F238E27FC236}">
-                <a16:creationId xmlns:a16="http://schemas.microsoft.com/office/drawing/2014/main" id="{F6313078-8817-48F6-7B08-C9325B46B1A9}"/>
-              </a:ext>
-            </a:extLst>
-          </p:cNvPr>
+          <p:cNvPr id="6" name="Slide Number Placeholder 5"/>
           <p:cNvSpPr>
             <a:spLocks noGrp="1"/>
           </p:cNvSpPr>
@@ -1457,7 +1352,7 @@
     </p:spTree>
     <p:extLst>
       <p:ext uri="{BB962C8B-B14F-4D97-AF65-F5344CB8AC3E}">
-        <p14:creationId xmlns:p14="http://schemas.microsoft.com/office/powerpoint/2010/main" val="1616374278"/>
+        <p14:creationId xmlns:p14="http://schemas.microsoft.com/office/powerpoint/2010/main" val="354526939"/>
       </p:ext>
     </p:extLst>
   </p:cSld>
@@ -1486,13 +1381,7 @@
       </p:grpSpPr>
       <p:sp>
         <p:nvSpPr>
-          <p:cNvPr id="2" name="Title 1">
-            <a:extLst>
-              <a:ext uri="{FF2B5EF4-FFF2-40B4-BE49-F238E27FC236}">
-                <a16:creationId xmlns:a16="http://schemas.microsoft.com/office/drawing/2014/main" id="{A4E2A582-A70D-7AC4-8DE6-63A74616DE71}"/>
-              </a:ext>
-            </a:extLst>
-          </p:cNvPr>
+          <p:cNvPr id="2" name="Title 1"/>
           <p:cNvSpPr>
             <a:spLocks noGrp="1"/>
           </p:cNvSpPr>
@@ -1502,15 +1391,15 @@
         </p:nvSpPr>
         <p:spPr>
           <a:xfrm>
-            <a:off x="831850" y="1709738"/>
-            <a:ext cx="10515600" cy="2852737"/>
+            <a:off x="467916" y="3039537"/>
+            <a:ext cx="5915025" cy="5071532"/>
           </a:xfrm>
         </p:spPr>
         <p:txBody>
           <a:bodyPr anchor="b"/>
           <a:lstStyle>
             <a:lvl1pPr>
-              <a:defRPr sz="6000"/>
+              <a:defRPr sz="4500"/>
             </a:lvl1pPr>
           </a:lstStyle>
           <a:p>
@@ -1518,19 +1407,13 @@
               <a:rPr lang="en-US"/>
               <a:t>Click to edit Master title style</a:t>
             </a:r>
-            <a:endParaRPr lang="en-GB"/>
-          </a:p>
-        </p:txBody>
-      </p:sp>
-      <p:sp>
-        <p:nvSpPr>
-          <p:cNvPr id="3" name="Text Placeholder 2">
-            <a:extLst>
-              <a:ext uri="{FF2B5EF4-FFF2-40B4-BE49-F238E27FC236}">
-                <a16:creationId xmlns:a16="http://schemas.microsoft.com/office/drawing/2014/main" id="{4B78BB6F-A333-0E78-4AA7-1209E04E8B47}"/>
-              </a:ext>
-            </a:extLst>
-          </p:cNvPr>
+            <a:endParaRPr lang="en-US" dirty="0"/>
+          </a:p>
+        </p:txBody>
+      </p:sp>
+      <p:sp>
+        <p:nvSpPr>
+          <p:cNvPr id="3" name="Text Placeholder 2"/>
           <p:cNvSpPr>
             <a:spLocks noGrp="1"/>
           </p:cNvSpPr>
@@ -1540,8 +1423,8 @@
         </p:nvSpPr>
         <p:spPr>
           <a:xfrm>
-            <a:off x="831850" y="4589463"/>
-            <a:ext cx="10515600" cy="1500187"/>
+            <a:off x="467916" y="8159048"/>
+            <a:ext cx="5915025" cy="2666999"/>
           </a:xfrm>
         </p:spPr>
         <p:txBody>
@@ -1549,17 +1432,15 @@
           <a:lstStyle>
             <a:lvl1pPr marL="0" indent="0">
               <a:buNone/>
-              <a:defRPr sz="2400">
+              <a:defRPr sz="1800">
                 <a:solidFill>
-                  <a:schemeClr val="tx1">
-                    <a:tint val="75000"/>
-                  </a:schemeClr>
+                  <a:schemeClr val="tx1"/>
                 </a:solidFill>
               </a:defRPr>
             </a:lvl1pPr>
-            <a:lvl2pPr marL="457200" indent="0">
-              <a:buNone/>
-              <a:defRPr sz="2000">
+            <a:lvl2pPr marL="342900" indent="0">
+              <a:buNone/>
+              <a:defRPr sz="1500">
                 <a:solidFill>
                   <a:schemeClr val="tx1">
                     <a:tint val="75000"/>
@@ -1567,9 +1448,9 @@
                 </a:solidFill>
               </a:defRPr>
             </a:lvl2pPr>
-            <a:lvl3pPr marL="914400" indent="0">
-              <a:buNone/>
-              <a:defRPr sz="1800">
+            <a:lvl3pPr marL="685800" indent="0">
+              <a:buNone/>
+              <a:defRPr sz="1350">
                 <a:solidFill>
                   <a:schemeClr val="tx1">
                     <a:tint val="75000"/>
@@ -1577,9 +1458,9 @@
                 </a:solidFill>
               </a:defRPr>
             </a:lvl3pPr>
-            <a:lvl4pPr marL="1371600" indent="0">
-              <a:buNone/>
-              <a:defRPr sz="1600">
+            <a:lvl4pPr marL="1028700" indent="0">
+              <a:buNone/>
+              <a:defRPr sz="1200">
                 <a:solidFill>
                   <a:schemeClr val="tx1">
                     <a:tint val="75000"/>
@@ -1587,9 +1468,9 @@
                 </a:solidFill>
               </a:defRPr>
             </a:lvl4pPr>
-            <a:lvl5pPr marL="1828800" indent="0">
-              <a:buNone/>
-              <a:defRPr sz="1600">
+            <a:lvl5pPr marL="1371600" indent="0">
+              <a:buNone/>
+              <a:defRPr sz="1200">
                 <a:solidFill>
                   <a:schemeClr val="tx1">
                     <a:tint val="75000"/>
@@ -1597,9 +1478,9 @@
                 </a:solidFill>
               </a:defRPr>
             </a:lvl5pPr>
-            <a:lvl6pPr marL="2286000" indent="0">
-              <a:buNone/>
-              <a:defRPr sz="1600">
+            <a:lvl6pPr marL="1714500" indent="0">
+              <a:buNone/>
+              <a:defRPr sz="1200">
                 <a:solidFill>
                   <a:schemeClr val="tx1">
                     <a:tint val="75000"/>
@@ -1607,9 +1488,9 @@
                 </a:solidFill>
               </a:defRPr>
             </a:lvl6pPr>
-            <a:lvl7pPr marL="2743200" indent="0">
-              <a:buNone/>
-              <a:defRPr sz="1600">
+            <a:lvl7pPr marL="2057400" indent="0">
+              <a:buNone/>
+              <a:defRPr sz="1200">
                 <a:solidFill>
                   <a:schemeClr val="tx1">
                     <a:tint val="75000"/>
@@ -1617,9 +1498,9 @@
                 </a:solidFill>
               </a:defRPr>
             </a:lvl7pPr>
-            <a:lvl8pPr marL="3200400" indent="0">
-              <a:buNone/>
-              <a:defRPr sz="1600">
+            <a:lvl8pPr marL="2400300" indent="0">
+              <a:buNone/>
+              <a:defRPr sz="1200">
                 <a:solidFill>
                   <a:schemeClr val="tx1">
                     <a:tint val="75000"/>
@@ -1627,9 +1508,9 @@
                 </a:solidFill>
               </a:defRPr>
             </a:lvl8pPr>
-            <a:lvl9pPr marL="3657600" indent="0">
-              <a:buNone/>
-              <a:defRPr sz="1600">
+            <a:lvl9pPr marL="2743200" indent="0">
+              <a:buNone/>
+              <a:defRPr sz="1200">
                 <a:solidFill>
                   <a:schemeClr val="tx1">
                     <a:tint val="75000"/>
@@ -1649,13 +1530,7 @@
       </p:sp>
       <p:sp>
         <p:nvSpPr>
-          <p:cNvPr id="4" name="Date Placeholder 3">
-            <a:extLst>
-              <a:ext uri="{FF2B5EF4-FFF2-40B4-BE49-F238E27FC236}">
-                <a16:creationId xmlns:a16="http://schemas.microsoft.com/office/drawing/2014/main" id="{3CAD82FB-D38D-4DFF-44D6-2BBE0E4583EC}"/>
-              </a:ext>
-            </a:extLst>
-          </p:cNvPr>
+          <p:cNvPr id="4" name="Date Placeholder 3"/>
           <p:cNvSpPr>
             <a:spLocks noGrp="1"/>
           </p:cNvSpPr>
@@ -1670,7 +1545,7 @@
           <a:p>
             <a:fld id="{780C652B-FE7E-4554-84A2-6BDBCA1E2D75}" type="datetimeFigureOut">
               <a:rPr lang="en-GB" smtClean="0"/>
-              <a:t>11/11/2022</a:t>
+              <a:t>14/11/2022</a:t>
             </a:fld>
             <a:endParaRPr lang="en-GB"/>
           </a:p>
@@ -1678,13 +1553,7 @@
       </p:sp>
       <p:sp>
         <p:nvSpPr>
-          <p:cNvPr id="5" name="Footer Placeholder 4">
-            <a:extLst>
-              <a:ext uri="{FF2B5EF4-FFF2-40B4-BE49-F238E27FC236}">
-                <a16:creationId xmlns:a16="http://schemas.microsoft.com/office/drawing/2014/main" id="{AC5CD3DF-F009-A048-D23C-CC0F17B4A3CA}"/>
-              </a:ext>
-            </a:extLst>
-          </p:cNvPr>
+          <p:cNvPr id="5" name="Footer Placeholder 4"/>
           <p:cNvSpPr>
             <a:spLocks noGrp="1"/>
           </p:cNvSpPr>
@@ -1703,13 +1572,7 @@
       </p:sp>
       <p:sp>
         <p:nvSpPr>
-          <p:cNvPr id="6" name="Slide Number Placeholder 5">
-            <a:extLst>
-              <a:ext uri="{FF2B5EF4-FFF2-40B4-BE49-F238E27FC236}">
-                <a16:creationId xmlns:a16="http://schemas.microsoft.com/office/drawing/2014/main" id="{C45710AC-53CD-8694-7C7C-EF21CA1F43F4}"/>
-              </a:ext>
-            </a:extLst>
-          </p:cNvPr>
+          <p:cNvPr id="6" name="Slide Number Placeholder 5"/>
           <p:cNvSpPr>
             <a:spLocks noGrp="1"/>
           </p:cNvSpPr>
@@ -1733,7 +1596,7 @@
     </p:spTree>
     <p:extLst>
       <p:ext uri="{BB962C8B-B14F-4D97-AF65-F5344CB8AC3E}">
-        <p14:creationId xmlns:p14="http://schemas.microsoft.com/office/powerpoint/2010/main" val="3306162509"/>
+        <p14:creationId xmlns:p14="http://schemas.microsoft.com/office/powerpoint/2010/main" val="2824427101"/>
       </p:ext>
     </p:extLst>
   </p:cSld>
@@ -1762,13 +1625,7 @@
       </p:grpSpPr>
       <p:sp>
         <p:nvSpPr>
-          <p:cNvPr id="2" name="Title 1">
-            <a:extLst>
-              <a:ext uri="{FF2B5EF4-FFF2-40B4-BE49-F238E27FC236}">
-                <a16:creationId xmlns:a16="http://schemas.microsoft.com/office/drawing/2014/main" id="{C29CA3E0-913E-5246-6B43-27C4691806AC}"/>
-              </a:ext>
-            </a:extLst>
-          </p:cNvPr>
+          <p:cNvPr id="2" name="Title 1"/>
           <p:cNvSpPr>
             <a:spLocks noGrp="1"/>
           </p:cNvSpPr>
@@ -1785,19 +1642,13 @@
               <a:rPr lang="en-US"/>
               <a:t>Click to edit Master title style</a:t>
             </a:r>
-            <a:endParaRPr lang="en-GB"/>
-          </a:p>
-        </p:txBody>
-      </p:sp>
-      <p:sp>
-        <p:nvSpPr>
-          <p:cNvPr id="3" name="Content Placeholder 2">
-            <a:extLst>
-              <a:ext uri="{FF2B5EF4-FFF2-40B4-BE49-F238E27FC236}">
-                <a16:creationId xmlns:a16="http://schemas.microsoft.com/office/drawing/2014/main" id="{6DB75093-8563-3615-AE64-A44773F2B1EC}"/>
-              </a:ext>
-            </a:extLst>
-          </p:cNvPr>
+            <a:endParaRPr lang="en-US" dirty="0"/>
+          </a:p>
+        </p:txBody>
+      </p:sp>
+      <p:sp>
+        <p:nvSpPr>
+          <p:cNvPr id="3" name="Content Placeholder 2"/>
           <p:cNvSpPr>
             <a:spLocks noGrp="1"/>
           </p:cNvSpPr>
@@ -1807,8 +1658,8 @@
         </p:nvSpPr>
         <p:spPr>
           <a:xfrm>
-            <a:off x="838200" y="1825625"/>
-            <a:ext cx="5181600" cy="4351338"/>
+            <a:off x="471488" y="3245556"/>
+            <a:ext cx="2914650" cy="7735712"/>
           </a:xfrm>
         </p:spPr>
         <p:txBody>
@@ -1848,19 +1699,13 @@
               <a:rPr lang="en-US"/>
               <a:t>Fifth level</a:t>
             </a:r>
-            <a:endParaRPr lang="en-GB"/>
-          </a:p>
-        </p:txBody>
-      </p:sp>
-      <p:sp>
-        <p:nvSpPr>
-          <p:cNvPr id="4" name="Content Placeholder 3">
-            <a:extLst>
-              <a:ext uri="{FF2B5EF4-FFF2-40B4-BE49-F238E27FC236}">
-                <a16:creationId xmlns:a16="http://schemas.microsoft.com/office/drawing/2014/main" id="{CF11EA85-ADEE-5135-0CFA-BAF05468F723}"/>
-              </a:ext>
-            </a:extLst>
-          </p:cNvPr>
+            <a:endParaRPr lang="en-US" dirty="0"/>
+          </a:p>
+        </p:txBody>
+      </p:sp>
+      <p:sp>
+        <p:nvSpPr>
+          <p:cNvPr id="4" name="Content Placeholder 3"/>
           <p:cNvSpPr>
             <a:spLocks noGrp="1"/>
           </p:cNvSpPr>
@@ -1870,8 +1715,8 @@
         </p:nvSpPr>
         <p:spPr>
           <a:xfrm>
-            <a:off x="6172200" y="1825625"/>
-            <a:ext cx="5181600" cy="4351338"/>
+            <a:off x="3471863" y="3245556"/>
+            <a:ext cx="2914650" cy="7735712"/>
           </a:xfrm>
         </p:spPr>
         <p:txBody>
@@ -1911,19 +1756,13 @@
               <a:rPr lang="en-US"/>
               <a:t>Fifth level</a:t>
             </a:r>
-            <a:endParaRPr lang="en-GB"/>
-          </a:p>
-        </p:txBody>
-      </p:sp>
-      <p:sp>
-        <p:nvSpPr>
-          <p:cNvPr id="5" name="Date Placeholder 4">
-            <a:extLst>
-              <a:ext uri="{FF2B5EF4-FFF2-40B4-BE49-F238E27FC236}">
-                <a16:creationId xmlns:a16="http://schemas.microsoft.com/office/drawing/2014/main" id="{ED5EEAB9-B038-9D03-89E2-C06454230175}"/>
-              </a:ext>
-            </a:extLst>
-          </p:cNvPr>
+            <a:endParaRPr lang="en-US" dirty="0"/>
+          </a:p>
+        </p:txBody>
+      </p:sp>
+      <p:sp>
+        <p:nvSpPr>
+          <p:cNvPr id="5" name="Date Placeholder 4"/>
           <p:cNvSpPr>
             <a:spLocks noGrp="1"/>
           </p:cNvSpPr>
@@ -1938,7 +1777,7 @@
           <a:p>
             <a:fld id="{780C652B-FE7E-4554-84A2-6BDBCA1E2D75}" type="datetimeFigureOut">
               <a:rPr lang="en-GB" smtClean="0"/>
-              <a:t>11/11/2022</a:t>
+              <a:t>14/11/2022</a:t>
             </a:fld>
             <a:endParaRPr lang="en-GB"/>
           </a:p>
@@ -1946,13 +1785,7 @@
       </p:sp>
       <p:sp>
         <p:nvSpPr>
-          <p:cNvPr id="6" name="Footer Placeholder 5">
-            <a:extLst>
-              <a:ext uri="{FF2B5EF4-FFF2-40B4-BE49-F238E27FC236}">
-                <a16:creationId xmlns:a16="http://schemas.microsoft.com/office/drawing/2014/main" id="{5A2FF85C-7CC5-EEA6-F06F-998327E1CAE1}"/>
-              </a:ext>
-            </a:extLst>
-          </p:cNvPr>
+          <p:cNvPr id="6" name="Footer Placeholder 5"/>
           <p:cNvSpPr>
             <a:spLocks noGrp="1"/>
           </p:cNvSpPr>
@@ -1971,13 +1804,7 @@
       </p:sp>
       <p:sp>
         <p:nvSpPr>
-          <p:cNvPr id="7" name="Slide Number Placeholder 6">
-            <a:extLst>
-              <a:ext uri="{FF2B5EF4-FFF2-40B4-BE49-F238E27FC236}">
-                <a16:creationId xmlns:a16="http://schemas.microsoft.com/office/drawing/2014/main" id="{7B0B61F0-0688-35C6-2EA0-76BC14AFBDB9}"/>
-              </a:ext>
-            </a:extLst>
-          </p:cNvPr>
+          <p:cNvPr id="7" name="Slide Number Placeholder 6"/>
           <p:cNvSpPr>
             <a:spLocks noGrp="1"/>
           </p:cNvSpPr>
@@ -2001,7 +1828,7 @@
     </p:spTree>
     <p:extLst>
       <p:ext uri="{BB962C8B-B14F-4D97-AF65-F5344CB8AC3E}">
-        <p14:creationId xmlns:p14="http://schemas.microsoft.com/office/powerpoint/2010/main" val="601341515"/>
+        <p14:creationId xmlns:p14="http://schemas.microsoft.com/office/powerpoint/2010/main" val="50527939"/>
       </p:ext>
     </p:extLst>
   </p:cSld>
@@ -2030,13 +1857,7 @@
       </p:grpSpPr>
       <p:sp>
         <p:nvSpPr>
-          <p:cNvPr id="2" name="Title 1">
-            <a:extLst>
-              <a:ext uri="{FF2B5EF4-FFF2-40B4-BE49-F238E27FC236}">
-                <a16:creationId xmlns:a16="http://schemas.microsoft.com/office/drawing/2014/main" id="{4CD527C3-FA75-169D-8DE2-34E1F8A66474}"/>
-              </a:ext>
-            </a:extLst>
-          </p:cNvPr>
+          <p:cNvPr id="2" name="Title 1"/>
           <p:cNvSpPr>
             <a:spLocks noGrp="1"/>
           </p:cNvSpPr>
@@ -2046,8 +1867,8 @@
         </p:nvSpPr>
         <p:spPr>
           <a:xfrm>
-            <a:off x="839788" y="365125"/>
-            <a:ext cx="10515600" cy="1325563"/>
+            <a:off x="472381" y="649114"/>
+            <a:ext cx="5915025" cy="2356556"/>
           </a:xfrm>
         </p:spPr>
         <p:txBody>
@@ -2058,19 +1879,13 @@
               <a:rPr lang="en-US"/>
               <a:t>Click to edit Master title style</a:t>
             </a:r>
-            <a:endParaRPr lang="en-GB"/>
-          </a:p>
-        </p:txBody>
-      </p:sp>
-      <p:sp>
-        <p:nvSpPr>
-          <p:cNvPr id="3" name="Text Placeholder 2">
-            <a:extLst>
-              <a:ext uri="{FF2B5EF4-FFF2-40B4-BE49-F238E27FC236}">
-                <a16:creationId xmlns:a16="http://schemas.microsoft.com/office/drawing/2014/main" id="{8C7A2B40-6CEB-90BE-B41F-48D70B0FBB91}"/>
-              </a:ext>
-            </a:extLst>
-          </p:cNvPr>
+            <a:endParaRPr lang="en-US" dirty="0"/>
+          </a:p>
+        </p:txBody>
+      </p:sp>
+      <p:sp>
+        <p:nvSpPr>
+          <p:cNvPr id="3" name="Text Placeholder 2"/>
           <p:cNvSpPr>
             <a:spLocks noGrp="1"/>
           </p:cNvSpPr>
@@ -2080,8 +1895,8 @@
         </p:nvSpPr>
         <p:spPr>
           <a:xfrm>
-            <a:off x="839788" y="1681163"/>
-            <a:ext cx="5157787" cy="823912"/>
+            <a:off x="472381" y="2988734"/>
+            <a:ext cx="2901255" cy="1464732"/>
           </a:xfrm>
         </p:spPr>
         <p:txBody>
@@ -2089,39 +1904,39 @@
           <a:lstStyle>
             <a:lvl1pPr marL="0" indent="0">
               <a:buNone/>
-              <a:defRPr sz="2400" b="1"/>
+              <a:defRPr sz="1800" b="1"/>
             </a:lvl1pPr>
-            <a:lvl2pPr marL="457200" indent="0">
-              <a:buNone/>
-              <a:defRPr sz="2000" b="1"/>
+            <a:lvl2pPr marL="342900" indent="0">
+              <a:buNone/>
+              <a:defRPr sz="1500" b="1"/>
             </a:lvl2pPr>
-            <a:lvl3pPr marL="914400" indent="0">
-              <a:buNone/>
-              <a:defRPr sz="1800" b="1"/>
+            <a:lvl3pPr marL="685800" indent="0">
+              <a:buNone/>
+              <a:defRPr sz="1350" b="1"/>
             </a:lvl3pPr>
-            <a:lvl4pPr marL="1371600" indent="0">
-              <a:buNone/>
-              <a:defRPr sz="1600" b="1"/>
+            <a:lvl4pPr marL="1028700" indent="0">
+              <a:buNone/>
+              <a:defRPr sz="1200" b="1"/>
             </a:lvl4pPr>
-            <a:lvl5pPr marL="1828800" indent="0">
-              <a:buNone/>
-              <a:defRPr sz="1600" b="1"/>
+            <a:lvl5pPr marL="1371600" indent="0">
+              <a:buNone/>
+              <a:defRPr sz="1200" b="1"/>
             </a:lvl5pPr>
-            <a:lvl6pPr marL="2286000" indent="0">
-              <a:buNone/>
-              <a:defRPr sz="1600" b="1"/>
+            <a:lvl6pPr marL="1714500" indent="0">
+              <a:buNone/>
+              <a:defRPr sz="1200" b="1"/>
             </a:lvl6pPr>
-            <a:lvl7pPr marL="2743200" indent="0">
-              <a:buNone/>
-              <a:defRPr sz="1600" b="1"/>
+            <a:lvl7pPr marL="2057400" indent="0">
+              <a:buNone/>
+              <a:defRPr sz="1200" b="1"/>
             </a:lvl7pPr>
-            <a:lvl8pPr marL="3200400" indent="0">
-              <a:buNone/>
-              <a:defRPr sz="1600" b="1"/>
+            <a:lvl8pPr marL="2400300" indent="0">
+              <a:buNone/>
+              <a:defRPr sz="1200" b="1"/>
             </a:lvl8pPr>
-            <a:lvl9pPr marL="3657600" indent="0">
-              <a:buNone/>
-              <a:defRPr sz="1600" b="1"/>
+            <a:lvl9pPr marL="2743200" indent="0">
+              <a:buNone/>
+              <a:defRPr sz="1200" b="1"/>
             </a:lvl9pPr>
           </a:lstStyle>
           <a:p>
@@ -2135,13 +1950,7 @@
       </p:sp>
       <p:sp>
         <p:nvSpPr>
-          <p:cNvPr id="4" name="Content Placeholder 3">
-            <a:extLst>
-              <a:ext uri="{FF2B5EF4-FFF2-40B4-BE49-F238E27FC236}">
-                <a16:creationId xmlns:a16="http://schemas.microsoft.com/office/drawing/2014/main" id="{0A429FA0-C638-2862-ED1B-193BB148C257}"/>
-              </a:ext>
-            </a:extLst>
-          </p:cNvPr>
+          <p:cNvPr id="4" name="Content Placeholder 3"/>
           <p:cNvSpPr>
             <a:spLocks noGrp="1"/>
           </p:cNvSpPr>
@@ -2151,8 +1960,8 @@
         </p:nvSpPr>
         <p:spPr>
           <a:xfrm>
-            <a:off x="839788" y="2505075"/>
-            <a:ext cx="5157787" cy="3684588"/>
+            <a:off x="472381" y="4453467"/>
+            <a:ext cx="2901255" cy="6550379"/>
           </a:xfrm>
         </p:spPr>
         <p:txBody>
@@ -2192,19 +2001,13 @@
               <a:rPr lang="en-US"/>
               <a:t>Fifth level</a:t>
             </a:r>
-            <a:endParaRPr lang="en-GB"/>
-          </a:p>
-        </p:txBody>
-      </p:sp>
-      <p:sp>
-        <p:nvSpPr>
-          <p:cNvPr id="5" name="Text Placeholder 4">
-            <a:extLst>
-              <a:ext uri="{FF2B5EF4-FFF2-40B4-BE49-F238E27FC236}">
-                <a16:creationId xmlns:a16="http://schemas.microsoft.com/office/drawing/2014/main" id="{9F2EA344-1B05-FD52-BD4C-E8B23C71453A}"/>
-              </a:ext>
-            </a:extLst>
-          </p:cNvPr>
+            <a:endParaRPr lang="en-US" dirty="0"/>
+          </a:p>
+        </p:txBody>
+      </p:sp>
+      <p:sp>
+        <p:nvSpPr>
+          <p:cNvPr id="5" name="Text Placeholder 4"/>
           <p:cNvSpPr>
             <a:spLocks noGrp="1"/>
           </p:cNvSpPr>
@@ -2214,8 +2017,8 @@
         </p:nvSpPr>
         <p:spPr>
           <a:xfrm>
-            <a:off x="6172200" y="1681163"/>
-            <a:ext cx="5183188" cy="823912"/>
+            <a:off x="3471863" y="2988734"/>
+            <a:ext cx="2915543" cy="1464732"/>
           </a:xfrm>
         </p:spPr>
         <p:txBody>
@@ -2223,39 +2026,39 @@
           <a:lstStyle>
             <a:lvl1pPr marL="0" indent="0">
               <a:buNone/>
-              <a:defRPr sz="2400" b="1"/>
+              <a:defRPr sz="1800" b="1"/>
             </a:lvl1pPr>
-            <a:lvl2pPr marL="457200" indent="0">
-              <a:buNone/>
-              <a:defRPr sz="2000" b="1"/>
+            <a:lvl2pPr marL="342900" indent="0">
+              <a:buNone/>
+              <a:defRPr sz="1500" b="1"/>
             </a:lvl2pPr>
-            <a:lvl3pPr marL="914400" indent="0">
-              <a:buNone/>
-              <a:defRPr sz="1800" b="1"/>
+            <a:lvl3pPr marL="685800" indent="0">
+              <a:buNone/>
+              <a:defRPr sz="1350" b="1"/>
             </a:lvl3pPr>
-            <a:lvl4pPr marL="1371600" indent="0">
-              <a:buNone/>
-              <a:defRPr sz="1600" b="1"/>
+            <a:lvl4pPr marL="1028700" indent="0">
+              <a:buNone/>
+              <a:defRPr sz="1200" b="1"/>
             </a:lvl4pPr>
-            <a:lvl5pPr marL="1828800" indent="0">
-              <a:buNone/>
-              <a:defRPr sz="1600" b="1"/>
+            <a:lvl5pPr marL="1371600" indent="0">
+              <a:buNone/>
+              <a:defRPr sz="1200" b="1"/>
             </a:lvl5pPr>
-            <a:lvl6pPr marL="2286000" indent="0">
-              <a:buNone/>
-              <a:defRPr sz="1600" b="1"/>
+            <a:lvl6pPr marL="1714500" indent="0">
+              <a:buNone/>
+              <a:defRPr sz="1200" b="1"/>
             </a:lvl6pPr>
-            <a:lvl7pPr marL="2743200" indent="0">
-              <a:buNone/>
-              <a:defRPr sz="1600" b="1"/>
+            <a:lvl7pPr marL="2057400" indent="0">
+              <a:buNone/>
+              <a:defRPr sz="1200" b="1"/>
             </a:lvl7pPr>
-            <a:lvl8pPr marL="3200400" indent="0">
-              <a:buNone/>
-              <a:defRPr sz="1600" b="1"/>
+            <a:lvl8pPr marL="2400300" indent="0">
+              <a:buNone/>
+              <a:defRPr sz="1200" b="1"/>
             </a:lvl8pPr>
-            <a:lvl9pPr marL="3657600" indent="0">
-              <a:buNone/>
-              <a:defRPr sz="1600" b="1"/>
+            <a:lvl9pPr marL="2743200" indent="0">
+              <a:buNone/>
+              <a:defRPr sz="1200" b="1"/>
             </a:lvl9pPr>
           </a:lstStyle>
           <a:p>
@@ -2269,13 +2072,7 @@
       </p:sp>
       <p:sp>
         <p:nvSpPr>
-          <p:cNvPr id="6" name="Content Placeholder 5">
-            <a:extLst>
-              <a:ext uri="{FF2B5EF4-FFF2-40B4-BE49-F238E27FC236}">
-                <a16:creationId xmlns:a16="http://schemas.microsoft.com/office/drawing/2014/main" id="{8AF25485-5F8D-950D-0DA0-1B65BBCAB1C9}"/>
-              </a:ext>
-            </a:extLst>
-          </p:cNvPr>
+          <p:cNvPr id="6" name="Content Placeholder 5"/>
           <p:cNvSpPr>
             <a:spLocks noGrp="1"/>
           </p:cNvSpPr>
@@ -2285,8 +2082,8 @@
         </p:nvSpPr>
         <p:spPr>
           <a:xfrm>
-            <a:off x="6172200" y="2505075"/>
-            <a:ext cx="5183188" cy="3684588"/>
+            <a:off x="3471863" y="4453467"/>
+            <a:ext cx="2915543" cy="6550379"/>
           </a:xfrm>
         </p:spPr>
         <p:txBody>
@@ -2326,19 +2123,13 @@
               <a:rPr lang="en-US"/>
               <a:t>Fifth level</a:t>
             </a:r>
-            <a:endParaRPr lang="en-GB"/>
-          </a:p>
-        </p:txBody>
-      </p:sp>
-      <p:sp>
-        <p:nvSpPr>
-          <p:cNvPr id="7" name="Date Placeholder 6">
-            <a:extLst>
-              <a:ext uri="{FF2B5EF4-FFF2-40B4-BE49-F238E27FC236}">
-                <a16:creationId xmlns:a16="http://schemas.microsoft.com/office/drawing/2014/main" id="{D913D619-F1F9-EB99-8BAA-EA8B58BBE262}"/>
-              </a:ext>
-            </a:extLst>
-          </p:cNvPr>
+            <a:endParaRPr lang="en-US" dirty="0"/>
+          </a:p>
+        </p:txBody>
+      </p:sp>
+      <p:sp>
+        <p:nvSpPr>
+          <p:cNvPr id="7" name="Date Placeholder 6"/>
           <p:cNvSpPr>
             <a:spLocks noGrp="1"/>
           </p:cNvSpPr>
@@ -2353,7 +2144,7 @@
           <a:p>
             <a:fld id="{780C652B-FE7E-4554-84A2-6BDBCA1E2D75}" type="datetimeFigureOut">
               <a:rPr lang="en-GB" smtClean="0"/>
-              <a:t>11/11/2022</a:t>
+              <a:t>14/11/2022</a:t>
             </a:fld>
             <a:endParaRPr lang="en-GB"/>
           </a:p>
@@ -2361,13 +2152,7 @@
       </p:sp>
       <p:sp>
         <p:nvSpPr>
-          <p:cNvPr id="8" name="Footer Placeholder 7">
-            <a:extLst>
-              <a:ext uri="{FF2B5EF4-FFF2-40B4-BE49-F238E27FC236}">
-                <a16:creationId xmlns:a16="http://schemas.microsoft.com/office/drawing/2014/main" id="{7DFB63E2-3D7B-A16A-8592-30E7A3496CA4}"/>
-              </a:ext>
-            </a:extLst>
-          </p:cNvPr>
+          <p:cNvPr id="8" name="Footer Placeholder 7"/>
           <p:cNvSpPr>
             <a:spLocks noGrp="1"/>
           </p:cNvSpPr>
@@ -2386,13 +2171,7 @@
       </p:sp>
       <p:sp>
         <p:nvSpPr>
-          <p:cNvPr id="9" name="Slide Number Placeholder 8">
-            <a:extLst>
-              <a:ext uri="{FF2B5EF4-FFF2-40B4-BE49-F238E27FC236}">
-                <a16:creationId xmlns:a16="http://schemas.microsoft.com/office/drawing/2014/main" id="{191A4CDC-CF70-FD53-6003-DEC7094ED767}"/>
-              </a:ext>
-            </a:extLst>
-          </p:cNvPr>
+          <p:cNvPr id="9" name="Slide Number Placeholder 8"/>
           <p:cNvSpPr>
             <a:spLocks noGrp="1"/>
           </p:cNvSpPr>
@@ -2416,7 +2195,7 @@
     </p:spTree>
     <p:extLst>
       <p:ext uri="{BB962C8B-B14F-4D97-AF65-F5344CB8AC3E}">
-        <p14:creationId xmlns:p14="http://schemas.microsoft.com/office/powerpoint/2010/main" val="2093374744"/>
+        <p14:creationId xmlns:p14="http://schemas.microsoft.com/office/powerpoint/2010/main" val="2078309432"/>
       </p:ext>
     </p:extLst>
   </p:cSld>
@@ -2445,13 +2224,7 @@
       </p:grpSpPr>
       <p:sp>
         <p:nvSpPr>
-          <p:cNvPr id="2" name="Title 1">
-            <a:extLst>
-              <a:ext uri="{FF2B5EF4-FFF2-40B4-BE49-F238E27FC236}">
-                <a16:creationId xmlns:a16="http://schemas.microsoft.com/office/drawing/2014/main" id="{C0A08DDA-85C7-4970-8364-0DA45E01803A}"/>
-              </a:ext>
-            </a:extLst>
-          </p:cNvPr>
+          <p:cNvPr id="2" name="Title 1"/>
           <p:cNvSpPr>
             <a:spLocks noGrp="1"/>
           </p:cNvSpPr>
@@ -2468,19 +2241,13 @@
               <a:rPr lang="en-US"/>
               <a:t>Click to edit Master title style</a:t>
             </a:r>
-            <a:endParaRPr lang="en-GB"/>
-          </a:p>
-        </p:txBody>
-      </p:sp>
-      <p:sp>
-        <p:nvSpPr>
-          <p:cNvPr id="3" name="Date Placeholder 2">
-            <a:extLst>
-              <a:ext uri="{FF2B5EF4-FFF2-40B4-BE49-F238E27FC236}">
-                <a16:creationId xmlns:a16="http://schemas.microsoft.com/office/drawing/2014/main" id="{2FFF5689-2AEC-BDD4-D4AB-2AD657C0E70E}"/>
-              </a:ext>
-            </a:extLst>
-          </p:cNvPr>
+            <a:endParaRPr lang="en-US" dirty="0"/>
+          </a:p>
+        </p:txBody>
+      </p:sp>
+      <p:sp>
+        <p:nvSpPr>
+          <p:cNvPr id="3" name="Date Placeholder 2"/>
           <p:cNvSpPr>
             <a:spLocks noGrp="1"/>
           </p:cNvSpPr>
@@ -2495,7 +2262,7 @@
           <a:p>
             <a:fld id="{780C652B-FE7E-4554-84A2-6BDBCA1E2D75}" type="datetimeFigureOut">
               <a:rPr lang="en-GB" smtClean="0"/>
-              <a:t>11/11/2022</a:t>
+              <a:t>14/11/2022</a:t>
             </a:fld>
             <a:endParaRPr lang="en-GB"/>
           </a:p>
@@ -2503,13 +2270,7 @@
       </p:sp>
       <p:sp>
         <p:nvSpPr>
-          <p:cNvPr id="4" name="Footer Placeholder 3">
-            <a:extLst>
-              <a:ext uri="{FF2B5EF4-FFF2-40B4-BE49-F238E27FC236}">
-                <a16:creationId xmlns:a16="http://schemas.microsoft.com/office/drawing/2014/main" id="{45D20D7F-4337-9136-BFD9-900BDB778744}"/>
-              </a:ext>
-            </a:extLst>
-          </p:cNvPr>
+          <p:cNvPr id="4" name="Footer Placeholder 3"/>
           <p:cNvSpPr>
             <a:spLocks noGrp="1"/>
           </p:cNvSpPr>
@@ -2528,13 +2289,7 @@
       </p:sp>
       <p:sp>
         <p:nvSpPr>
-          <p:cNvPr id="5" name="Slide Number Placeholder 4">
-            <a:extLst>
-              <a:ext uri="{FF2B5EF4-FFF2-40B4-BE49-F238E27FC236}">
-                <a16:creationId xmlns:a16="http://schemas.microsoft.com/office/drawing/2014/main" id="{9F7C170B-EA40-3857-1627-DFF0D7665AC3}"/>
-              </a:ext>
-            </a:extLst>
-          </p:cNvPr>
+          <p:cNvPr id="5" name="Slide Number Placeholder 4"/>
           <p:cNvSpPr>
             <a:spLocks noGrp="1"/>
           </p:cNvSpPr>
@@ -2558,7 +2313,7 @@
     </p:spTree>
     <p:extLst>
       <p:ext uri="{BB962C8B-B14F-4D97-AF65-F5344CB8AC3E}">
-        <p14:creationId xmlns:p14="http://schemas.microsoft.com/office/powerpoint/2010/main" val="1071542896"/>
+        <p14:creationId xmlns:p14="http://schemas.microsoft.com/office/powerpoint/2010/main" val="21082702"/>
       </p:ext>
     </p:extLst>
   </p:cSld>
@@ -2587,13 +2342,7 @@
       </p:grpSpPr>
       <p:sp>
         <p:nvSpPr>
-          <p:cNvPr id="2" name="Date Placeholder 1">
-            <a:extLst>
-              <a:ext uri="{FF2B5EF4-FFF2-40B4-BE49-F238E27FC236}">
-                <a16:creationId xmlns:a16="http://schemas.microsoft.com/office/drawing/2014/main" id="{1B991CD5-F1FE-ECC5-F241-0CDB480CBD88}"/>
-              </a:ext>
-            </a:extLst>
-          </p:cNvPr>
+          <p:cNvPr id="2" name="Date Placeholder 1"/>
           <p:cNvSpPr>
             <a:spLocks noGrp="1"/>
           </p:cNvSpPr>
@@ -2608,7 +2357,7 @@
           <a:p>
             <a:fld id="{780C652B-FE7E-4554-84A2-6BDBCA1E2D75}" type="datetimeFigureOut">
               <a:rPr lang="en-GB" smtClean="0"/>
-              <a:t>11/11/2022</a:t>
+              <a:t>14/11/2022</a:t>
             </a:fld>
             <a:endParaRPr lang="en-GB"/>
           </a:p>
@@ -2616,13 +2365,7 @@
       </p:sp>
       <p:sp>
         <p:nvSpPr>
-          <p:cNvPr id="3" name="Footer Placeholder 2">
-            <a:extLst>
-              <a:ext uri="{FF2B5EF4-FFF2-40B4-BE49-F238E27FC236}">
-                <a16:creationId xmlns:a16="http://schemas.microsoft.com/office/drawing/2014/main" id="{00678582-CB1D-3AF2-D499-14F00E35CB70}"/>
-              </a:ext>
-            </a:extLst>
-          </p:cNvPr>
+          <p:cNvPr id="3" name="Footer Placeholder 2"/>
           <p:cNvSpPr>
             <a:spLocks noGrp="1"/>
           </p:cNvSpPr>
@@ -2641,13 +2384,7 @@
       </p:sp>
       <p:sp>
         <p:nvSpPr>
-          <p:cNvPr id="4" name="Slide Number Placeholder 3">
-            <a:extLst>
-              <a:ext uri="{FF2B5EF4-FFF2-40B4-BE49-F238E27FC236}">
-                <a16:creationId xmlns:a16="http://schemas.microsoft.com/office/drawing/2014/main" id="{B7ED2B4C-81AF-6B6C-B12C-147379F3288C}"/>
-              </a:ext>
-            </a:extLst>
-          </p:cNvPr>
+          <p:cNvPr id="4" name="Slide Number Placeholder 3"/>
           <p:cNvSpPr>
             <a:spLocks noGrp="1"/>
           </p:cNvSpPr>
@@ -2671,7 +2408,7 @@
     </p:spTree>
     <p:extLst>
       <p:ext uri="{BB962C8B-B14F-4D97-AF65-F5344CB8AC3E}">
-        <p14:creationId xmlns:p14="http://schemas.microsoft.com/office/powerpoint/2010/main" val="2298496782"/>
+        <p14:creationId xmlns:p14="http://schemas.microsoft.com/office/powerpoint/2010/main" val="1476627223"/>
       </p:ext>
     </p:extLst>
   </p:cSld>
@@ -2700,13 +2437,7 @@
       </p:grpSpPr>
       <p:sp>
         <p:nvSpPr>
-          <p:cNvPr id="2" name="Title 1">
-            <a:extLst>
-              <a:ext uri="{FF2B5EF4-FFF2-40B4-BE49-F238E27FC236}">
-                <a16:creationId xmlns:a16="http://schemas.microsoft.com/office/drawing/2014/main" id="{01FE4282-386F-B53A-BA4D-2E06B8A70D7C}"/>
-              </a:ext>
-            </a:extLst>
-          </p:cNvPr>
+          <p:cNvPr id="2" name="Title 1"/>
           <p:cNvSpPr>
             <a:spLocks noGrp="1"/>
           </p:cNvSpPr>
@@ -2716,15 +2447,15 @@
         </p:nvSpPr>
         <p:spPr>
           <a:xfrm>
-            <a:off x="839788" y="457200"/>
-            <a:ext cx="3932237" cy="1600200"/>
+            <a:off x="472381" y="812800"/>
+            <a:ext cx="2211884" cy="2844800"/>
           </a:xfrm>
         </p:spPr>
         <p:txBody>
           <a:bodyPr anchor="b"/>
           <a:lstStyle>
             <a:lvl1pPr>
-              <a:defRPr sz="3200"/>
+              <a:defRPr sz="2400"/>
             </a:lvl1pPr>
           </a:lstStyle>
           <a:p>
@@ -2732,19 +2463,13 @@
               <a:rPr lang="en-US"/>
               <a:t>Click to edit Master title style</a:t>
             </a:r>
-            <a:endParaRPr lang="en-GB"/>
-          </a:p>
-        </p:txBody>
-      </p:sp>
-      <p:sp>
-        <p:nvSpPr>
-          <p:cNvPr id="3" name="Content Placeholder 2">
-            <a:extLst>
-              <a:ext uri="{FF2B5EF4-FFF2-40B4-BE49-F238E27FC236}">
-                <a16:creationId xmlns:a16="http://schemas.microsoft.com/office/drawing/2014/main" id="{0EBC172E-FE22-79AA-F267-E23EDC9C912A}"/>
-              </a:ext>
-            </a:extLst>
-          </p:cNvPr>
+            <a:endParaRPr lang="en-US" dirty="0"/>
+          </a:p>
+        </p:txBody>
+      </p:sp>
+      <p:sp>
+        <p:nvSpPr>
+          <p:cNvPr id="3" name="Content Placeholder 2"/>
           <p:cNvSpPr>
             <a:spLocks noGrp="1"/>
           </p:cNvSpPr>
@@ -2754,39 +2479,39 @@
         </p:nvSpPr>
         <p:spPr>
           <a:xfrm>
-            <a:off x="5183188" y="987425"/>
-            <a:ext cx="6172200" cy="4873625"/>
+            <a:off x="2915543" y="1755425"/>
+            <a:ext cx="3471863" cy="8664222"/>
           </a:xfrm>
         </p:spPr>
         <p:txBody>
           <a:bodyPr/>
           <a:lstStyle>
             <a:lvl1pPr>
-              <a:defRPr sz="3200"/>
+              <a:defRPr sz="2400"/>
             </a:lvl1pPr>
             <a:lvl2pPr>
-              <a:defRPr sz="2800"/>
+              <a:defRPr sz="2100"/>
             </a:lvl2pPr>
             <a:lvl3pPr>
-              <a:defRPr sz="2400"/>
+              <a:defRPr sz="1800"/>
             </a:lvl3pPr>
             <a:lvl4pPr>
-              <a:defRPr sz="2000"/>
+              <a:defRPr sz="1500"/>
             </a:lvl4pPr>
             <a:lvl5pPr>
-              <a:defRPr sz="2000"/>
+              <a:defRPr sz="1500"/>
             </a:lvl5pPr>
             <a:lvl6pPr>
-              <a:defRPr sz="2000"/>
+              <a:defRPr sz="1500"/>
             </a:lvl6pPr>
             <a:lvl7pPr>
-              <a:defRPr sz="2000"/>
+              <a:defRPr sz="1500"/>
             </a:lvl7pPr>
             <a:lvl8pPr>
-              <a:defRPr sz="2000"/>
+              <a:defRPr sz="1500"/>
             </a:lvl8pPr>
             <a:lvl9pPr>
-              <a:defRPr sz="2000"/>
+              <a:defRPr sz="1500"/>
             </a:lvl9pPr>
           </a:lstStyle>
           <a:p>
@@ -2823,19 +2548,13 @@
               <a:rPr lang="en-US"/>
               <a:t>Fifth level</a:t>
             </a:r>
-            <a:endParaRPr lang="en-GB"/>
-          </a:p>
-        </p:txBody>
-      </p:sp>
-      <p:sp>
-        <p:nvSpPr>
-          <p:cNvPr id="4" name="Text Placeholder 3">
-            <a:extLst>
-              <a:ext uri="{FF2B5EF4-FFF2-40B4-BE49-F238E27FC236}">
-                <a16:creationId xmlns:a16="http://schemas.microsoft.com/office/drawing/2014/main" id="{8EF11204-C626-2461-C844-EF2239104D08}"/>
-              </a:ext>
-            </a:extLst>
-          </p:cNvPr>
+            <a:endParaRPr lang="en-US" dirty="0"/>
+          </a:p>
+        </p:txBody>
+      </p:sp>
+      <p:sp>
+        <p:nvSpPr>
+          <p:cNvPr id="4" name="Text Placeholder 3"/>
           <p:cNvSpPr>
             <a:spLocks noGrp="1"/>
           </p:cNvSpPr>
@@ -2845,8 +2564,8 @@
         </p:nvSpPr>
         <p:spPr>
           <a:xfrm>
-            <a:off x="839788" y="2057400"/>
-            <a:ext cx="3932237" cy="3811588"/>
+            <a:off x="472381" y="3657600"/>
+            <a:ext cx="2211884" cy="6776156"/>
           </a:xfrm>
         </p:spPr>
         <p:txBody>
@@ -2854,39 +2573,39 @@
           <a:lstStyle>
             <a:lvl1pPr marL="0" indent="0">
               <a:buNone/>
-              <a:defRPr sz="1600"/>
+              <a:defRPr sz="1200"/>
             </a:lvl1pPr>
-            <a:lvl2pPr marL="457200" indent="0">
-              <a:buNone/>
-              <a:defRPr sz="1400"/>
+            <a:lvl2pPr marL="342900" indent="0">
+              <a:buNone/>
+              <a:defRPr sz="1050"/>
             </a:lvl2pPr>
-            <a:lvl3pPr marL="914400" indent="0">
-              <a:buNone/>
-              <a:defRPr sz="1200"/>
+            <a:lvl3pPr marL="685800" indent="0">
+              <a:buNone/>
+              <a:defRPr sz="900"/>
             </a:lvl3pPr>
-            <a:lvl4pPr marL="1371600" indent="0">
-              <a:buNone/>
-              <a:defRPr sz="1000"/>
+            <a:lvl4pPr marL="1028700" indent="0">
+              <a:buNone/>
+              <a:defRPr sz="750"/>
             </a:lvl4pPr>
-            <a:lvl5pPr marL="1828800" indent="0">
-              <a:buNone/>
-              <a:defRPr sz="1000"/>
+            <a:lvl5pPr marL="1371600" indent="0">
+              <a:buNone/>
+              <a:defRPr sz="750"/>
             </a:lvl5pPr>
-            <a:lvl6pPr marL="2286000" indent="0">
-              <a:buNone/>
-              <a:defRPr sz="1000"/>
+            <a:lvl6pPr marL="1714500" indent="0">
+              <a:buNone/>
+              <a:defRPr sz="750"/>
             </a:lvl6pPr>
-            <a:lvl7pPr marL="2743200" indent="0">
-              <a:buNone/>
-              <a:defRPr sz="1000"/>
+            <a:lvl7pPr marL="2057400" indent="0">
+              <a:buNone/>
+              <a:defRPr sz="750"/>
             </a:lvl7pPr>
-            <a:lvl8pPr marL="3200400" indent="0">
-              <a:buNone/>
-              <a:defRPr sz="1000"/>
+            <a:lvl8pPr marL="2400300" indent="0">
+              <a:buNone/>
+              <a:defRPr sz="750"/>
             </a:lvl8pPr>
-            <a:lvl9pPr marL="3657600" indent="0">
-              <a:buNone/>
-              <a:defRPr sz="1000"/>
+            <a:lvl9pPr marL="2743200" indent="0">
+              <a:buNone/>
+              <a:defRPr sz="750"/>
             </a:lvl9pPr>
           </a:lstStyle>
           <a:p>
@@ -2900,13 +2619,7 @@
       </p:sp>
       <p:sp>
         <p:nvSpPr>
-          <p:cNvPr id="5" name="Date Placeholder 4">
-            <a:extLst>
-              <a:ext uri="{FF2B5EF4-FFF2-40B4-BE49-F238E27FC236}">
-                <a16:creationId xmlns:a16="http://schemas.microsoft.com/office/drawing/2014/main" id="{6B0325A7-3BC7-413D-1E78-B9EBEEAE2757}"/>
-              </a:ext>
-            </a:extLst>
-          </p:cNvPr>
+          <p:cNvPr id="5" name="Date Placeholder 4"/>
           <p:cNvSpPr>
             <a:spLocks noGrp="1"/>
           </p:cNvSpPr>
@@ -2921,7 +2634,7 @@
           <a:p>
             <a:fld id="{780C652B-FE7E-4554-84A2-6BDBCA1E2D75}" type="datetimeFigureOut">
               <a:rPr lang="en-GB" smtClean="0"/>
-              <a:t>11/11/2022</a:t>
+              <a:t>14/11/2022</a:t>
             </a:fld>
             <a:endParaRPr lang="en-GB"/>
           </a:p>
@@ -2929,13 +2642,7 @@
       </p:sp>
       <p:sp>
         <p:nvSpPr>
-          <p:cNvPr id="6" name="Footer Placeholder 5">
-            <a:extLst>
-              <a:ext uri="{FF2B5EF4-FFF2-40B4-BE49-F238E27FC236}">
-                <a16:creationId xmlns:a16="http://schemas.microsoft.com/office/drawing/2014/main" id="{AF1E42D8-EC77-E319-9A5D-31E0C7B4A422}"/>
-              </a:ext>
-            </a:extLst>
-          </p:cNvPr>
+          <p:cNvPr id="6" name="Footer Placeholder 5"/>
           <p:cNvSpPr>
             <a:spLocks noGrp="1"/>
           </p:cNvSpPr>
@@ -2954,13 +2661,7 @@
       </p:sp>
       <p:sp>
         <p:nvSpPr>
-          <p:cNvPr id="7" name="Slide Number Placeholder 6">
-            <a:extLst>
-              <a:ext uri="{FF2B5EF4-FFF2-40B4-BE49-F238E27FC236}">
-                <a16:creationId xmlns:a16="http://schemas.microsoft.com/office/drawing/2014/main" id="{CCA3254F-CD6E-73F1-5DA1-AFB15F6A0B36}"/>
-              </a:ext>
-            </a:extLst>
-          </p:cNvPr>
+          <p:cNvPr id="7" name="Slide Number Placeholder 6"/>
           <p:cNvSpPr>
             <a:spLocks noGrp="1"/>
           </p:cNvSpPr>
@@ -2984,7 +2685,7 @@
     </p:spTree>
     <p:extLst>
       <p:ext uri="{BB962C8B-B14F-4D97-AF65-F5344CB8AC3E}">
-        <p14:creationId xmlns:p14="http://schemas.microsoft.com/office/powerpoint/2010/main" val="520109867"/>
+        <p14:creationId xmlns:p14="http://schemas.microsoft.com/office/powerpoint/2010/main" val="1809948740"/>
       </p:ext>
     </p:extLst>
   </p:cSld>
@@ -3013,13 +2714,7 @@
       </p:grpSpPr>
       <p:sp>
         <p:nvSpPr>
-          <p:cNvPr id="2" name="Title 1">
-            <a:extLst>
-              <a:ext uri="{FF2B5EF4-FFF2-40B4-BE49-F238E27FC236}">
-                <a16:creationId xmlns:a16="http://schemas.microsoft.com/office/drawing/2014/main" id="{3D3B77B7-978C-16BC-294B-509CC1C3EB56}"/>
-              </a:ext>
-            </a:extLst>
-          </p:cNvPr>
+          <p:cNvPr id="2" name="Title 1"/>
           <p:cNvSpPr>
             <a:spLocks noGrp="1"/>
           </p:cNvSpPr>
@@ -3029,15 +2724,15 @@
         </p:nvSpPr>
         <p:spPr>
           <a:xfrm>
-            <a:off x="839788" y="457200"/>
-            <a:ext cx="3932237" cy="1600200"/>
+            <a:off x="472381" y="812800"/>
+            <a:ext cx="2211884" cy="2844800"/>
           </a:xfrm>
         </p:spPr>
         <p:txBody>
           <a:bodyPr anchor="b"/>
           <a:lstStyle>
             <a:lvl1pPr>
-              <a:defRPr sz="3200"/>
+              <a:defRPr sz="2400"/>
             </a:lvl1pPr>
           </a:lstStyle>
           <a:p>
@@ -3045,21 +2740,15 @@
               <a:rPr lang="en-US"/>
               <a:t>Click to edit Master title style</a:t>
             </a:r>
-            <a:endParaRPr lang="en-GB"/>
-          </a:p>
-        </p:txBody>
-      </p:sp>
-      <p:sp>
-        <p:nvSpPr>
-          <p:cNvPr id="3" name="Picture Placeholder 2">
-            <a:extLst>
-              <a:ext uri="{FF2B5EF4-FFF2-40B4-BE49-F238E27FC236}">
-                <a16:creationId xmlns:a16="http://schemas.microsoft.com/office/drawing/2014/main" id="{C40354B7-8DDA-6450-47D1-5C28C7B42C78}"/>
-              </a:ext>
-            </a:extLst>
-          </p:cNvPr>
-          <p:cNvSpPr>
-            <a:spLocks noGrp="1"/>
+            <a:endParaRPr lang="en-US" dirty="0"/>
+          </a:p>
+        </p:txBody>
+      </p:sp>
+      <p:sp>
+        <p:nvSpPr>
+          <p:cNvPr id="3" name="Picture Placeholder 2"/>
+          <p:cNvSpPr>
+            <a:spLocks noGrp="1" noChangeAspect="1"/>
           </p:cNvSpPr>
           <p:nvPr>
             <p:ph type="pic" idx="1"/>
@@ -3067,8 +2756,73 @@
         </p:nvSpPr>
         <p:spPr>
           <a:xfrm>
-            <a:off x="5183188" y="987425"/>
-            <a:ext cx="6172200" cy="4873625"/>
+            <a:off x="2915543" y="1755425"/>
+            <a:ext cx="3471863" cy="8664222"/>
+          </a:xfrm>
+        </p:spPr>
+        <p:txBody>
+          <a:bodyPr anchor="t"/>
+          <a:lstStyle>
+            <a:lvl1pPr marL="0" indent="0">
+              <a:buNone/>
+              <a:defRPr sz="2400"/>
+            </a:lvl1pPr>
+            <a:lvl2pPr marL="342900" indent="0">
+              <a:buNone/>
+              <a:defRPr sz="2100"/>
+            </a:lvl2pPr>
+            <a:lvl3pPr marL="685800" indent="0">
+              <a:buNone/>
+              <a:defRPr sz="1800"/>
+            </a:lvl3pPr>
+            <a:lvl4pPr marL="1028700" indent="0">
+              <a:buNone/>
+              <a:defRPr sz="1500"/>
+            </a:lvl4pPr>
+            <a:lvl5pPr marL="1371600" indent="0">
+              <a:buNone/>
+              <a:defRPr sz="1500"/>
+            </a:lvl5pPr>
+            <a:lvl6pPr marL="1714500" indent="0">
+              <a:buNone/>
+              <a:defRPr sz="1500"/>
+            </a:lvl6pPr>
+            <a:lvl7pPr marL="2057400" indent="0">
+              <a:buNone/>
+              <a:defRPr sz="1500"/>
+            </a:lvl7pPr>
+            <a:lvl8pPr marL="2400300" indent="0">
+              <a:buNone/>
+              <a:defRPr sz="1500"/>
+            </a:lvl8pPr>
+            <a:lvl9pPr marL="2743200" indent="0">
+              <a:buNone/>
+              <a:defRPr sz="1500"/>
+            </a:lvl9pPr>
+          </a:lstStyle>
+          <a:p>
+            <a:r>
+              <a:rPr lang="en-US"/>
+              <a:t>Click icon to add picture</a:t>
+            </a:r>
+            <a:endParaRPr lang="en-US" dirty="0"/>
+          </a:p>
+        </p:txBody>
+      </p:sp>
+      <p:sp>
+        <p:nvSpPr>
+          <p:cNvPr id="4" name="Text Placeholder 3"/>
+          <p:cNvSpPr>
+            <a:spLocks noGrp="1"/>
+          </p:cNvSpPr>
+          <p:nvPr>
+            <p:ph type="body" sz="half" idx="2"/>
+          </p:nvPr>
+        </p:nvSpPr>
+        <p:spPr>
+          <a:xfrm>
+            <a:off x="472381" y="3657600"/>
+            <a:ext cx="2211884" cy="6776156"/>
           </a:xfrm>
         </p:spPr>
         <p:txBody>
@@ -3076,109 +2830,42 @@
           <a:lstStyle>
             <a:lvl1pPr marL="0" indent="0">
               <a:buNone/>
-              <a:defRPr sz="3200"/>
+              <a:defRPr sz="1200"/>
             </a:lvl1pPr>
-            <a:lvl2pPr marL="457200" indent="0">
-              <a:buNone/>
-              <a:defRPr sz="2800"/>
+            <a:lvl2pPr marL="342900" indent="0">
+              <a:buNone/>
+              <a:defRPr sz="1050"/>
             </a:lvl2pPr>
-            <a:lvl3pPr marL="914400" indent="0">
-              <a:buNone/>
-              <a:defRPr sz="2400"/>
+            <a:lvl3pPr marL="685800" indent="0">
+              <a:buNone/>
+              <a:defRPr sz="900"/>
             </a:lvl3pPr>
-            <a:lvl4pPr marL="1371600" indent="0">
-              <a:buNone/>
-              <a:defRPr sz="2000"/>
+            <a:lvl4pPr marL="1028700" indent="0">
+              <a:buNone/>
+              <a:defRPr sz="750"/>
             </a:lvl4pPr>
-            <a:lvl5pPr marL="1828800" indent="0">
-              <a:buNone/>
-              <a:defRPr sz="2000"/>
+            <a:lvl5pPr marL="1371600" indent="0">
+              <a:buNone/>
+              <a:defRPr sz="750"/>
             </a:lvl5pPr>
-            <a:lvl6pPr marL="2286000" indent="0">
-              <a:buNone/>
-              <a:defRPr sz="2000"/>
+            <a:lvl6pPr marL="1714500" indent="0">
+              <a:buNone/>
+              <a:defRPr sz="750"/>
             </a:lvl6pPr>
-            <a:lvl7pPr marL="2743200" indent="0">
-              <a:buNone/>
-              <a:defRPr sz="2000"/>
+            <a:lvl7pPr marL="2057400" indent="0">
+              <a:buNone/>
+              <a:defRPr sz="750"/>
             </a:lvl7pPr>
-            <a:lvl8pPr marL="3200400" indent="0">
-              <a:buNone/>
-              <a:defRPr sz="2000"/>
+            <a:lvl8pPr marL="2400300" indent="0">
+              <a:buNone/>
+              <a:defRPr sz="750"/>
             </a:lvl8pPr>
-            <a:lvl9pPr marL="3657600" indent="0">
-              <a:buNone/>
-              <a:defRPr sz="2000"/>
+            <a:lvl9pPr marL="2743200" indent="0">
+              <a:buNone/>
+              <a:defRPr sz="750"/>
             </a:lvl9pPr>
           </a:lstStyle>
           <a:p>
-            <a:endParaRPr lang="en-GB"/>
-          </a:p>
-        </p:txBody>
-      </p:sp>
-      <p:sp>
-        <p:nvSpPr>
-          <p:cNvPr id="4" name="Text Placeholder 3">
-            <a:extLst>
-              <a:ext uri="{FF2B5EF4-FFF2-40B4-BE49-F238E27FC236}">
-                <a16:creationId xmlns:a16="http://schemas.microsoft.com/office/drawing/2014/main" id="{0C674D90-7143-EB30-2788-1B5DF37408D3}"/>
-              </a:ext>
-            </a:extLst>
-          </p:cNvPr>
-          <p:cNvSpPr>
-            <a:spLocks noGrp="1"/>
-          </p:cNvSpPr>
-          <p:nvPr>
-            <p:ph type="body" sz="half" idx="2"/>
-          </p:nvPr>
-        </p:nvSpPr>
-        <p:spPr>
-          <a:xfrm>
-            <a:off x="839788" y="2057400"/>
-            <a:ext cx="3932237" cy="3811588"/>
-          </a:xfrm>
-        </p:spPr>
-        <p:txBody>
-          <a:bodyPr/>
-          <a:lstStyle>
-            <a:lvl1pPr marL="0" indent="0">
-              <a:buNone/>
-              <a:defRPr sz="1600"/>
-            </a:lvl1pPr>
-            <a:lvl2pPr marL="457200" indent="0">
-              <a:buNone/>
-              <a:defRPr sz="1400"/>
-            </a:lvl2pPr>
-            <a:lvl3pPr marL="914400" indent="0">
-              <a:buNone/>
-              <a:defRPr sz="1200"/>
-            </a:lvl3pPr>
-            <a:lvl4pPr marL="1371600" indent="0">
-              <a:buNone/>
-              <a:defRPr sz="1000"/>
-            </a:lvl4pPr>
-            <a:lvl5pPr marL="1828800" indent="0">
-              <a:buNone/>
-              <a:defRPr sz="1000"/>
-            </a:lvl5pPr>
-            <a:lvl6pPr marL="2286000" indent="0">
-              <a:buNone/>
-              <a:defRPr sz="1000"/>
-            </a:lvl6pPr>
-            <a:lvl7pPr marL="2743200" indent="0">
-              <a:buNone/>
-              <a:defRPr sz="1000"/>
-            </a:lvl7pPr>
-            <a:lvl8pPr marL="3200400" indent="0">
-              <a:buNone/>
-              <a:defRPr sz="1000"/>
-            </a:lvl8pPr>
-            <a:lvl9pPr marL="3657600" indent="0">
-              <a:buNone/>
-              <a:defRPr sz="1000"/>
-            </a:lvl9pPr>
-          </a:lstStyle>
-          <a:p>
             <a:pPr lvl="0"/>
             <a:r>
               <a:rPr lang="en-US"/>
@@ -3189,13 +2876,7 @@
       </p:sp>
       <p:sp>
         <p:nvSpPr>
-          <p:cNvPr id="5" name="Date Placeholder 4">
-            <a:extLst>
-              <a:ext uri="{FF2B5EF4-FFF2-40B4-BE49-F238E27FC236}">
-                <a16:creationId xmlns:a16="http://schemas.microsoft.com/office/drawing/2014/main" id="{83F8D6DA-270D-87E0-0A90-DF212346D320}"/>
-              </a:ext>
-            </a:extLst>
-          </p:cNvPr>
+          <p:cNvPr id="5" name="Date Placeholder 4"/>
           <p:cNvSpPr>
             <a:spLocks noGrp="1"/>
           </p:cNvSpPr>
@@ -3210,7 +2891,7 @@
           <a:p>
             <a:fld id="{780C652B-FE7E-4554-84A2-6BDBCA1E2D75}" type="datetimeFigureOut">
               <a:rPr lang="en-GB" smtClean="0"/>
-              <a:t>11/11/2022</a:t>
+              <a:t>14/11/2022</a:t>
             </a:fld>
             <a:endParaRPr lang="en-GB"/>
           </a:p>
@@ -3218,13 +2899,7 @@
       </p:sp>
       <p:sp>
         <p:nvSpPr>
-          <p:cNvPr id="6" name="Footer Placeholder 5">
-            <a:extLst>
-              <a:ext uri="{FF2B5EF4-FFF2-40B4-BE49-F238E27FC236}">
-                <a16:creationId xmlns:a16="http://schemas.microsoft.com/office/drawing/2014/main" id="{6FD391D9-B3C2-A9C2-ADF6-39249BE9A133}"/>
-              </a:ext>
-            </a:extLst>
-          </p:cNvPr>
+          <p:cNvPr id="6" name="Footer Placeholder 5"/>
           <p:cNvSpPr>
             <a:spLocks noGrp="1"/>
           </p:cNvSpPr>
@@ -3243,13 +2918,7 @@
       </p:sp>
       <p:sp>
         <p:nvSpPr>
-          <p:cNvPr id="7" name="Slide Number Placeholder 6">
-            <a:extLst>
-              <a:ext uri="{FF2B5EF4-FFF2-40B4-BE49-F238E27FC236}">
-                <a16:creationId xmlns:a16="http://schemas.microsoft.com/office/drawing/2014/main" id="{0E8C09C4-5EB9-A13B-8370-0969FB977167}"/>
-              </a:ext>
-            </a:extLst>
-          </p:cNvPr>
+          <p:cNvPr id="7" name="Slide Number Placeholder 6"/>
           <p:cNvSpPr>
             <a:spLocks noGrp="1"/>
           </p:cNvSpPr>
@@ -3273,7 +2942,7 @@
     </p:spTree>
     <p:extLst>
       <p:ext uri="{BB962C8B-B14F-4D97-AF65-F5344CB8AC3E}">
-        <p14:creationId xmlns:p14="http://schemas.microsoft.com/office/powerpoint/2010/main" val="2455866831"/>
+        <p14:creationId xmlns:p14="http://schemas.microsoft.com/office/powerpoint/2010/main" val="930852994"/>
       </p:ext>
     </p:extLst>
   </p:cSld>
@@ -3307,13 +2976,7 @@
       </p:grpSpPr>
       <p:sp>
         <p:nvSpPr>
-          <p:cNvPr id="2" name="Title Placeholder 1">
-            <a:extLst>
-              <a:ext uri="{FF2B5EF4-FFF2-40B4-BE49-F238E27FC236}">
-                <a16:creationId xmlns:a16="http://schemas.microsoft.com/office/drawing/2014/main" id="{CE44A1F6-49F3-1D79-B8BE-1363EAB66E0A}"/>
-              </a:ext>
-            </a:extLst>
-          </p:cNvPr>
+          <p:cNvPr id="2" name="Title Placeholder 1"/>
           <p:cNvSpPr>
             <a:spLocks noGrp="1"/>
           </p:cNvSpPr>
@@ -3323,8 +2986,8 @@
         </p:nvSpPr>
         <p:spPr>
           <a:xfrm>
-            <a:off x="838200" y="365125"/>
-            <a:ext cx="10515600" cy="1325563"/>
+            <a:off x="471488" y="649114"/>
+            <a:ext cx="5915025" cy="2356556"/>
           </a:xfrm>
           <a:prstGeom prst="rect">
             <a:avLst/>
@@ -3340,19 +3003,13 @@
               <a:rPr lang="en-US"/>
               <a:t>Click to edit Master title style</a:t>
             </a:r>
-            <a:endParaRPr lang="en-GB"/>
-          </a:p>
-        </p:txBody>
-      </p:sp>
-      <p:sp>
-        <p:nvSpPr>
-          <p:cNvPr id="3" name="Text Placeholder 2">
-            <a:extLst>
-              <a:ext uri="{FF2B5EF4-FFF2-40B4-BE49-F238E27FC236}">
-                <a16:creationId xmlns:a16="http://schemas.microsoft.com/office/drawing/2014/main" id="{52C6E44C-EEEA-D35B-4F92-63C448032B08}"/>
-              </a:ext>
-            </a:extLst>
-          </p:cNvPr>
+            <a:endParaRPr lang="en-US" dirty="0"/>
+          </a:p>
+        </p:txBody>
+      </p:sp>
+      <p:sp>
+        <p:nvSpPr>
+          <p:cNvPr id="3" name="Text Placeholder 2"/>
           <p:cNvSpPr>
             <a:spLocks noGrp="1"/>
           </p:cNvSpPr>
@@ -3362,8 +3019,8 @@
         </p:nvSpPr>
         <p:spPr>
           <a:xfrm>
-            <a:off x="838200" y="1825625"/>
-            <a:ext cx="10515600" cy="4351338"/>
+            <a:off x="471488" y="3245556"/>
+            <a:ext cx="5915025" cy="7735712"/>
           </a:xfrm>
           <a:prstGeom prst="rect">
             <a:avLst/>
@@ -3408,19 +3065,13 @@
               <a:rPr lang="en-US"/>
               <a:t>Fifth level</a:t>
             </a:r>
-            <a:endParaRPr lang="en-GB"/>
-          </a:p>
-        </p:txBody>
-      </p:sp>
-      <p:sp>
-        <p:nvSpPr>
-          <p:cNvPr id="4" name="Date Placeholder 3">
-            <a:extLst>
-              <a:ext uri="{FF2B5EF4-FFF2-40B4-BE49-F238E27FC236}">
-                <a16:creationId xmlns:a16="http://schemas.microsoft.com/office/drawing/2014/main" id="{94D16C29-CA80-EF0C-BD5E-695D982F90A6}"/>
-              </a:ext>
-            </a:extLst>
-          </p:cNvPr>
+            <a:endParaRPr lang="en-US" dirty="0"/>
+          </a:p>
+        </p:txBody>
+      </p:sp>
+      <p:sp>
+        <p:nvSpPr>
+          <p:cNvPr id="4" name="Date Placeholder 3"/>
           <p:cNvSpPr>
             <a:spLocks noGrp="1"/>
           </p:cNvSpPr>
@@ -3430,8 +3081,8 @@
         </p:nvSpPr>
         <p:spPr>
           <a:xfrm>
-            <a:off x="838200" y="6356350"/>
-            <a:ext cx="2743200" cy="365125"/>
+            <a:off x="471488" y="11300181"/>
+            <a:ext cx="1543050" cy="649111"/>
           </a:xfrm>
           <a:prstGeom prst="rect">
             <a:avLst/>
@@ -3441,7 +3092,7 @@
           <a:bodyPr vert="horz" lIns="91440" tIns="45720" rIns="91440" bIns="45720" rtlCol="0" anchor="ctr"/>
           <a:lstStyle>
             <a:lvl1pPr algn="l">
-              <a:defRPr sz="1200">
+              <a:defRPr sz="900">
                 <a:solidFill>
                   <a:schemeClr val="tx1">
                     <a:tint val="75000"/>
@@ -3453,7 +3104,7 @@
           <a:p>
             <a:fld id="{780C652B-FE7E-4554-84A2-6BDBCA1E2D75}" type="datetimeFigureOut">
               <a:rPr lang="en-GB" smtClean="0"/>
-              <a:t>11/11/2022</a:t>
+              <a:t>14/11/2022</a:t>
             </a:fld>
             <a:endParaRPr lang="en-GB"/>
           </a:p>
@@ -3461,13 +3112,7 @@
       </p:sp>
       <p:sp>
         <p:nvSpPr>
-          <p:cNvPr id="5" name="Footer Placeholder 4">
-            <a:extLst>
-              <a:ext uri="{FF2B5EF4-FFF2-40B4-BE49-F238E27FC236}">
-                <a16:creationId xmlns:a16="http://schemas.microsoft.com/office/drawing/2014/main" id="{3BD9F496-8078-2915-E577-5D85FD25C37A}"/>
-              </a:ext>
-            </a:extLst>
-          </p:cNvPr>
+          <p:cNvPr id="5" name="Footer Placeholder 4"/>
           <p:cNvSpPr>
             <a:spLocks noGrp="1"/>
           </p:cNvSpPr>
@@ -3477,8 +3122,8 @@
         </p:nvSpPr>
         <p:spPr>
           <a:xfrm>
-            <a:off x="4038600" y="6356350"/>
-            <a:ext cx="4114800" cy="365125"/>
+            <a:off x="2271713" y="11300181"/>
+            <a:ext cx="2314575" cy="649111"/>
           </a:xfrm>
           <a:prstGeom prst="rect">
             <a:avLst/>
@@ -3488,7 +3133,7 @@
           <a:bodyPr vert="horz" lIns="91440" tIns="45720" rIns="91440" bIns="45720" rtlCol="0" anchor="ctr"/>
           <a:lstStyle>
             <a:lvl1pPr algn="ctr">
-              <a:defRPr sz="1200">
+              <a:defRPr sz="900">
                 <a:solidFill>
                   <a:schemeClr val="tx1">
                     <a:tint val="75000"/>
@@ -3504,13 +3149,7 @@
       </p:sp>
       <p:sp>
         <p:nvSpPr>
-          <p:cNvPr id="6" name="Slide Number Placeholder 5">
-            <a:extLst>
-              <a:ext uri="{FF2B5EF4-FFF2-40B4-BE49-F238E27FC236}">
-                <a16:creationId xmlns:a16="http://schemas.microsoft.com/office/drawing/2014/main" id="{729C7A66-13FE-14CC-8781-0A4169D26654}"/>
-              </a:ext>
-            </a:extLst>
-          </p:cNvPr>
+          <p:cNvPr id="6" name="Slide Number Placeholder 5"/>
           <p:cNvSpPr>
             <a:spLocks noGrp="1"/>
           </p:cNvSpPr>
@@ -3520,8 +3159,8 @@
         </p:nvSpPr>
         <p:spPr>
           <a:xfrm>
-            <a:off x="8610600" y="6356350"/>
-            <a:ext cx="2743200" cy="365125"/>
+            <a:off x="4843463" y="11300181"/>
+            <a:ext cx="1543050" cy="649111"/>
           </a:xfrm>
           <a:prstGeom prst="rect">
             <a:avLst/>
@@ -3531,7 +3170,7 @@
           <a:bodyPr vert="horz" lIns="91440" tIns="45720" rIns="91440" bIns="45720" rtlCol="0" anchor="ctr"/>
           <a:lstStyle>
             <a:lvl1pPr algn="r">
-              <a:defRPr sz="1200">
+              <a:defRPr sz="900">
                 <a:solidFill>
                   <a:schemeClr val="tx1">
                     <a:tint val="75000"/>
@@ -3552,27 +3191,27 @@
     </p:spTree>
     <p:extLst>
       <p:ext uri="{BB962C8B-B14F-4D97-AF65-F5344CB8AC3E}">
-        <p14:creationId xmlns:p14="http://schemas.microsoft.com/office/powerpoint/2010/main" val="58867466"/>
+        <p14:creationId xmlns:p14="http://schemas.microsoft.com/office/powerpoint/2010/main" val="715651800"/>
       </p:ext>
     </p:extLst>
   </p:cSld>
   <p:clrMap bg1="lt1" tx1="dk1" bg2="lt2" tx2="dk2" accent1="accent1" accent2="accent2" accent3="accent3" accent4="accent4" accent5="accent5" accent6="accent6" hlink="hlink" folHlink="folHlink"/>
   <p:sldLayoutIdLst>
-    <p:sldLayoutId id="2147483649" r:id="rId1"/>
-    <p:sldLayoutId id="2147483650" r:id="rId2"/>
-    <p:sldLayoutId id="2147483651" r:id="rId3"/>
-    <p:sldLayoutId id="2147483652" r:id="rId4"/>
-    <p:sldLayoutId id="2147483653" r:id="rId5"/>
-    <p:sldLayoutId id="2147483654" r:id="rId6"/>
-    <p:sldLayoutId id="2147483655" r:id="rId7"/>
-    <p:sldLayoutId id="2147483656" r:id="rId8"/>
-    <p:sldLayoutId id="2147483657" r:id="rId9"/>
-    <p:sldLayoutId id="2147483658" r:id="rId10"/>
-    <p:sldLayoutId id="2147483659" r:id="rId11"/>
+    <p:sldLayoutId id="2147483661" r:id="rId1"/>
+    <p:sldLayoutId id="2147483662" r:id="rId2"/>
+    <p:sldLayoutId id="2147483663" r:id="rId3"/>
+    <p:sldLayoutId id="2147483664" r:id="rId4"/>
+    <p:sldLayoutId id="2147483665" r:id="rId5"/>
+    <p:sldLayoutId id="2147483666" r:id="rId6"/>
+    <p:sldLayoutId id="2147483667" r:id="rId7"/>
+    <p:sldLayoutId id="2147483668" r:id="rId8"/>
+    <p:sldLayoutId id="2147483669" r:id="rId9"/>
+    <p:sldLayoutId id="2147483670" r:id="rId10"/>
+    <p:sldLayoutId id="2147483671" r:id="rId11"/>
   </p:sldLayoutIdLst>
   <p:txStyles>
     <p:titleStyle>
-      <a:lvl1pPr algn="l" defTabSz="914400" rtl="0" eaLnBrk="1" latinLnBrk="0" hangingPunct="1">
+      <a:lvl1pPr algn="l" defTabSz="685800" rtl="0" eaLnBrk="1" latinLnBrk="0" hangingPunct="1">
         <a:lnSpc>
           <a:spcPct val="90000"/>
         </a:lnSpc>
@@ -3580,7 +3219,7 @@
           <a:spcPct val="0"/>
         </a:spcBef>
         <a:buNone/>
-        <a:defRPr sz="4400" kern="1200">
+        <a:defRPr sz="3300" kern="1200">
           <a:solidFill>
             <a:schemeClr val="tx1"/>
           </a:solidFill>
@@ -3591,16 +3230,16 @@
       </a:lvl1pPr>
     </p:titleStyle>
     <p:bodyStyle>
-      <a:lvl1pPr marL="228600" indent="-228600" algn="l" defTabSz="914400" rtl="0" eaLnBrk="1" latinLnBrk="0" hangingPunct="1">
+      <a:lvl1pPr marL="171450" indent="-171450" algn="l" defTabSz="685800" rtl="0" eaLnBrk="1" latinLnBrk="0" hangingPunct="1">
         <a:lnSpc>
           <a:spcPct val="90000"/>
         </a:lnSpc>
         <a:spcBef>
-          <a:spcPts val="1000"/>
+          <a:spcPts val="750"/>
         </a:spcBef>
         <a:buFont typeface="Arial" panose="020B0604020202020204" pitchFamily="34" charset="0"/>
         <a:buChar char="•"/>
-        <a:defRPr sz="2800" kern="1200">
+        <a:defRPr sz="2100" kern="1200">
           <a:solidFill>
             <a:schemeClr val="tx1"/>
           </a:solidFill>
@@ -3609,48 +3248,12 @@
           <a:cs typeface="+mn-cs"/>
         </a:defRPr>
       </a:lvl1pPr>
-      <a:lvl2pPr marL="685800" indent="-228600" algn="l" defTabSz="914400" rtl="0" eaLnBrk="1" latinLnBrk="0" hangingPunct="1">
+      <a:lvl2pPr marL="514350" indent="-171450" algn="l" defTabSz="685800" rtl="0" eaLnBrk="1" latinLnBrk="0" hangingPunct="1">
         <a:lnSpc>
           <a:spcPct val="90000"/>
         </a:lnSpc>
         <a:spcBef>
-          <a:spcPts val="500"/>
-        </a:spcBef>
-        <a:buFont typeface="Arial" panose="020B0604020202020204" pitchFamily="34" charset="0"/>
-        <a:buChar char="•"/>
-        <a:defRPr sz="2400" kern="1200">
-          <a:solidFill>
-            <a:schemeClr val="tx1"/>
-          </a:solidFill>
-          <a:latin typeface="+mn-lt"/>
-          <a:ea typeface="+mn-ea"/>
-          <a:cs typeface="+mn-cs"/>
-        </a:defRPr>
-      </a:lvl2pPr>
-      <a:lvl3pPr marL="1143000" indent="-228600" algn="l" defTabSz="914400" rtl="0" eaLnBrk="1" latinLnBrk="0" hangingPunct="1">
-        <a:lnSpc>
-          <a:spcPct val="90000"/>
-        </a:lnSpc>
-        <a:spcBef>
-          <a:spcPts val="500"/>
-        </a:spcBef>
-        <a:buFont typeface="Arial" panose="020B0604020202020204" pitchFamily="34" charset="0"/>
-        <a:buChar char="•"/>
-        <a:defRPr sz="2000" kern="1200">
-          <a:solidFill>
-            <a:schemeClr val="tx1"/>
-          </a:solidFill>
-          <a:latin typeface="+mn-lt"/>
-          <a:ea typeface="+mn-ea"/>
-          <a:cs typeface="+mn-cs"/>
-        </a:defRPr>
-      </a:lvl3pPr>
-      <a:lvl4pPr marL="1600200" indent="-228600" algn="l" defTabSz="914400" rtl="0" eaLnBrk="1" latinLnBrk="0" hangingPunct="1">
-        <a:lnSpc>
-          <a:spcPct val="90000"/>
-        </a:lnSpc>
-        <a:spcBef>
-          <a:spcPts val="500"/>
+          <a:spcPts val="375"/>
         </a:spcBef>
         <a:buFont typeface="Arial" panose="020B0604020202020204" pitchFamily="34" charset="0"/>
         <a:buChar char="•"/>
@@ -3662,17 +3265,53 @@
           <a:ea typeface="+mn-ea"/>
           <a:cs typeface="+mn-cs"/>
         </a:defRPr>
-      </a:lvl4pPr>
-      <a:lvl5pPr marL="2057400" indent="-228600" algn="l" defTabSz="914400" rtl="0" eaLnBrk="1" latinLnBrk="0" hangingPunct="1">
+      </a:lvl2pPr>
+      <a:lvl3pPr marL="857250" indent="-171450" algn="l" defTabSz="685800" rtl="0" eaLnBrk="1" latinLnBrk="0" hangingPunct="1">
         <a:lnSpc>
           <a:spcPct val="90000"/>
         </a:lnSpc>
         <a:spcBef>
-          <a:spcPts val="500"/>
+          <a:spcPts val="375"/>
         </a:spcBef>
         <a:buFont typeface="Arial" panose="020B0604020202020204" pitchFamily="34" charset="0"/>
         <a:buChar char="•"/>
-        <a:defRPr sz="1800" kern="1200">
+        <a:defRPr sz="1500" kern="1200">
+          <a:solidFill>
+            <a:schemeClr val="tx1"/>
+          </a:solidFill>
+          <a:latin typeface="+mn-lt"/>
+          <a:ea typeface="+mn-ea"/>
+          <a:cs typeface="+mn-cs"/>
+        </a:defRPr>
+      </a:lvl3pPr>
+      <a:lvl4pPr marL="1200150" indent="-171450" algn="l" defTabSz="685800" rtl="0" eaLnBrk="1" latinLnBrk="0" hangingPunct="1">
+        <a:lnSpc>
+          <a:spcPct val="90000"/>
+        </a:lnSpc>
+        <a:spcBef>
+          <a:spcPts val="375"/>
+        </a:spcBef>
+        <a:buFont typeface="Arial" panose="020B0604020202020204" pitchFamily="34" charset="0"/>
+        <a:buChar char="•"/>
+        <a:defRPr sz="1350" kern="1200">
+          <a:solidFill>
+            <a:schemeClr val="tx1"/>
+          </a:solidFill>
+          <a:latin typeface="+mn-lt"/>
+          <a:ea typeface="+mn-ea"/>
+          <a:cs typeface="+mn-cs"/>
+        </a:defRPr>
+      </a:lvl4pPr>
+      <a:lvl5pPr marL="1543050" indent="-171450" algn="l" defTabSz="685800" rtl="0" eaLnBrk="1" latinLnBrk="0" hangingPunct="1">
+        <a:lnSpc>
+          <a:spcPct val="90000"/>
+        </a:lnSpc>
+        <a:spcBef>
+          <a:spcPts val="375"/>
+        </a:spcBef>
+        <a:buFont typeface="Arial" panose="020B0604020202020204" pitchFamily="34" charset="0"/>
+        <a:buChar char="•"/>
+        <a:defRPr sz="1350" kern="1200">
           <a:solidFill>
             <a:schemeClr val="tx1"/>
           </a:solidFill>
@@ -3681,16 +3320,16 @@
           <a:cs typeface="+mn-cs"/>
         </a:defRPr>
       </a:lvl5pPr>
-      <a:lvl6pPr marL="2514600" indent="-228600" algn="l" defTabSz="914400" rtl="0" eaLnBrk="1" latinLnBrk="0" hangingPunct="1">
+      <a:lvl6pPr marL="1885950" indent="-171450" algn="l" defTabSz="685800" rtl="0" eaLnBrk="1" latinLnBrk="0" hangingPunct="1">
         <a:lnSpc>
           <a:spcPct val="90000"/>
         </a:lnSpc>
         <a:spcBef>
-          <a:spcPts val="500"/>
+          <a:spcPts val="375"/>
         </a:spcBef>
         <a:buFont typeface="Arial" panose="020B0604020202020204" pitchFamily="34" charset="0"/>
         <a:buChar char="•"/>
-        <a:defRPr sz="1800" kern="1200">
+        <a:defRPr sz="1350" kern="1200">
           <a:solidFill>
             <a:schemeClr val="tx1"/>
           </a:solidFill>
@@ -3699,16 +3338,16 @@
           <a:cs typeface="+mn-cs"/>
         </a:defRPr>
       </a:lvl6pPr>
-      <a:lvl7pPr marL="2971800" indent="-228600" algn="l" defTabSz="914400" rtl="0" eaLnBrk="1" latinLnBrk="0" hangingPunct="1">
+      <a:lvl7pPr marL="2228850" indent="-171450" algn="l" defTabSz="685800" rtl="0" eaLnBrk="1" latinLnBrk="0" hangingPunct="1">
         <a:lnSpc>
           <a:spcPct val="90000"/>
         </a:lnSpc>
         <a:spcBef>
-          <a:spcPts val="500"/>
+          <a:spcPts val="375"/>
         </a:spcBef>
         <a:buFont typeface="Arial" panose="020B0604020202020204" pitchFamily="34" charset="0"/>
         <a:buChar char="•"/>
-        <a:defRPr sz="1800" kern="1200">
+        <a:defRPr sz="1350" kern="1200">
           <a:solidFill>
             <a:schemeClr val="tx1"/>
           </a:solidFill>
@@ -3717,16 +3356,16 @@
           <a:cs typeface="+mn-cs"/>
         </a:defRPr>
       </a:lvl7pPr>
-      <a:lvl8pPr marL="3429000" indent="-228600" algn="l" defTabSz="914400" rtl="0" eaLnBrk="1" latinLnBrk="0" hangingPunct="1">
+      <a:lvl8pPr marL="2571750" indent="-171450" algn="l" defTabSz="685800" rtl="0" eaLnBrk="1" latinLnBrk="0" hangingPunct="1">
         <a:lnSpc>
           <a:spcPct val="90000"/>
         </a:lnSpc>
         <a:spcBef>
-          <a:spcPts val="500"/>
+          <a:spcPts val="375"/>
         </a:spcBef>
         <a:buFont typeface="Arial" panose="020B0604020202020204" pitchFamily="34" charset="0"/>
         <a:buChar char="•"/>
-        <a:defRPr sz="1800" kern="1200">
+        <a:defRPr sz="1350" kern="1200">
           <a:solidFill>
             <a:schemeClr val="tx1"/>
           </a:solidFill>
@@ -3735,16 +3374,16 @@
           <a:cs typeface="+mn-cs"/>
         </a:defRPr>
       </a:lvl8pPr>
-      <a:lvl9pPr marL="3886200" indent="-228600" algn="l" defTabSz="914400" rtl="0" eaLnBrk="1" latinLnBrk="0" hangingPunct="1">
+      <a:lvl9pPr marL="2914650" indent="-171450" algn="l" defTabSz="685800" rtl="0" eaLnBrk="1" latinLnBrk="0" hangingPunct="1">
         <a:lnSpc>
           <a:spcPct val="90000"/>
         </a:lnSpc>
         <a:spcBef>
-          <a:spcPts val="500"/>
+          <a:spcPts val="375"/>
         </a:spcBef>
         <a:buFont typeface="Arial" panose="020B0604020202020204" pitchFamily="34" charset="0"/>
         <a:buChar char="•"/>
-        <a:defRPr sz="1800" kern="1200">
+        <a:defRPr sz="1350" kern="1200">
           <a:solidFill>
             <a:schemeClr val="tx1"/>
           </a:solidFill>
@@ -3758,8 +3397,8 @@
       <a:defPPr>
         <a:defRPr lang="en-US"/>
       </a:defPPr>
-      <a:lvl1pPr marL="0" algn="l" defTabSz="914400" rtl="0" eaLnBrk="1" latinLnBrk="0" hangingPunct="1">
-        <a:defRPr sz="1800" kern="1200">
+      <a:lvl1pPr marL="0" algn="l" defTabSz="685800" rtl="0" eaLnBrk="1" latinLnBrk="0" hangingPunct="1">
+        <a:defRPr sz="1350" kern="1200">
           <a:solidFill>
             <a:schemeClr val="tx1"/>
           </a:solidFill>
@@ -3768,8 +3407,8 @@
           <a:cs typeface="+mn-cs"/>
         </a:defRPr>
       </a:lvl1pPr>
-      <a:lvl2pPr marL="457200" algn="l" defTabSz="914400" rtl="0" eaLnBrk="1" latinLnBrk="0" hangingPunct="1">
-        <a:defRPr sz="1800" kern="1200">
+      <a:lvl2pPr marL="342900" algn="l" defTabSz="685800" rtl="0" eaLnBrk="1" latinLnBrk="0" hangingPunct="1">
+        <a:defRPr sz="1350" kern="1200">
           <a:solidFill>
             <a:schemeClr val="tx1"/>
           </a:solidFill>
@@ -3778,8 +3417,8 @@
           <a:cs typeface="+mn-cs"/>
         </a:defRPr>
       </a:lvl2pPr>
-      <a:lvl3pPr marL="914400" algn="l" defTabSz="914400" rtl="0" eaLnBrk="1" latinLnBrk="0" hangingPunct="1">
-        <a:defRPr sz="1800" kern="1200">
+      <a:lvl3pPr marL="685800" algn="l" defTabSz="685800" rtl="0" eaLnBrk="1" latinLnBrk="0" hangingPunct="1">
+        <a:defRPr sz="1350" kern="1200">
           <a:solidFill>
             <a:schemeClr val="tx1"/>
           </a:solidFill>
@@ -3788,8 +3427,8 @@
           <a:cs typeface="+mn-cs"/>
         </a:defRPr>
       </a:lvl3pPr>
-      <a:lvl4pPr marL="1371600" algn="l" defTabSz="914400" rtl="0" eaLnBrk="1" latinLnBrk="0" hangingPunct="1">
-        <a:defRPr sz="1800" kern="1200">
+      <a:lvl4pPr marL="1028700" algn="l" defTabSz="685800" rtl="0" eaLnBrk="1" latinLnBrk="0" hangingPunct="1">
+        <a:defRPr sz="1350" kern="1200">
           <a:solidFill>
             <a:schemeClr val="tx1"/>
           </a:solidFill>
@@ -3798,8 +3437,8 @@
           <a:cs typeface="+mn-cs"/>
         </a:defRPr>
       </a:lvl4pPr>
-      <a:lvl5pPr marL="1828800" algn="l" defTabSz="914400" rtl="0" eaLnBrk="1" latinLnBrk="0" hangingPunct="1">
-        <a:defRPr sz="1800" kern="1200">
+      <a:lvl5pPr marL="1371600" algn="l" defTabSz="685800" rtl="0" eaLnBrk="1" latinLnBrk="0" hangingPunct="1">
+        <a:defRPr sz="1350" kern="1200">
           <a:solidFill>
             <a:schemeClr val="tx1"/>
           </a:solidFill>
@@ -3808,8 +3447,8 @@
           <a:cs typeface="+mn-cs"/>
         </a:defRPr>
       </a:lvl5pPr>
-      <a:lvl6pPr marL="2286000" algn="l" defTabSz="914400" rtl="0" eaLnBrk="1" latinLnBrk="0" hangingPunct="1">
-        <a:defRPr sz="1800" kern="1200">
+      <a:lvl6pPr marL="1714500" algn="l" defTabSz="685800" rtl="0" eaLnBrk="1" latinLnBrk="0" hangingPunct="1">
+        <a:defRPr sz="1350" kern="1200">
           <a:solidFill>
             <a:schemeClr val="tx1"/>
           </a:solidFill>
@@ -3818,8 +3457,8 @@
           <a:cs typeface="+mn-cs"/>
         </a:defRPr>
       </a:lvl6pPr>
-      <a:lvl7pPr marL="2743200" algn="l" defTabSz="914400" rtl="0" eaLnBrk="1" latinLnBrk="0" hangingPunct="1">
-        <a:defRPr sz="1800" kern="1200">
+      <a:lvl7pPr marL="2057400" algn="l" defTabSz="685800" rtl="0" eaLnBrk="1" latinLnBrk="0" hangingPunct="1">
+        <a:defRPr sz="1350" kern="1200">
           <a:solidFill>
             <a:schemeClr val="tx1"/>
           </a:solidFill>
@@ -3828,8 +3467,8 @@
           <a:cs typeface="+mn-cs"/>
         </a:defRPr>
       </a:lvl7pPr>
-      <a:lvl8pPr marL="3200400" algn="l" defTabSz="914400" rtl="0" eaLnBrk="1" latinLnBrk="0" hangingPunct="1">
-        <a:defRPr sz="1800" kern="1200">
+      <a:lvl8pPr marL="2400300" algn="l" defTabSz="685800" rtl="0" eaLnBrk="1" latinLnBrk="0" hangingPunct="1">
+        <a:defRPr sz="1350" kern="1200">
           <a:solidFill>
             <a:schemeClr val="tx1"/>
           </a:solidFill>
@@ -3838,8 +3477,8 @@
           <a:cs typeface="+mn-cs"/>
         </a:defRPr>
       </a:lvl8pPr>
-      <a:lvl9pPr marL="3657600" algn="l" defTabSz="914400" rtl="0" eaLnBrk="1" latinLnBrk="0" hangingPunct="1">
-        <a:defRPr sz="1800" kern="1200">
+      <a:lvl9pPr marL="2743200" algn="l" defTabSz="685800" rtl="0" eaLnBrk="1" latinLnBrk="0" hangingPunct="1">
+        <a:defRPr sz="1350" kern="1200">
           <a:solidFill>
             <a:schemeClr val="tx1"/>
           </a:solidFill>
@@ -3892,8 +3531,8 @@
         </p:blipFill>
         <p:spPr>
           <a:xfrm>
-            <a:off x="1742799" y="324471"/>
-            <a:ext cx="8706402" cy="6209057"/>
+            <a:off x="980326" y="4349704"/>
+            <a:ext cx="4897351" cy="3492595"/>
           </a:xfrm>
           <a:prstGeom prst="rect">
             <a:avLst/>
@@ -3946,13 +3585,13 @@
         </p:nvPicPr>
         <p:blipFill rotWithShape="1">
           <a:blip r:embed="rId3"/>
-          <a:srcRect l="7822" t="6022" r="62962" b="26176"/>
+          <a:srcRect l="8083" t="6750" r="63585" b="26175"/>
           <a:stretch/>
         </p:blipFill>
         <p:spPr>
           <a:xfrm>
-            <a:off x="3982312" y="-69384"/>
-            <a:ext cx="4227375" cy="6996768"/>
+            <a:off x="1377000" y="2676000"/>
+            <a:ext cx="4104000" cy="6929294"/>
           </a:xfrm>
           <a:prstGeom prst="rect">
             <a:avLst/>
@@ -3973,7 +3612,7 @@
         </p:nvSpPr>
         <p:spPr>
           <a:xfrm>
-            <a:off x="4044000" y="9000"/>
+            <a:off x="1377000" y="2676000"/>
             <a:ext cx="4104000" cy="6840000"/>
           </a:xfrm>
           <a:prstGeom prst="rect">
@@ -4005,7 +3644,7 @@
           <a:lstStyle/>
           <a:p>
             <a:pPr algn="ctr"/>
-            <a:endParaRPr lang="en-GB"/>
+            <a:endParaRPr lang="en-GB" sz="1013"/>
           </a:p>
         </p:txBody>
       </p:sp>
@@ -4025,8 +3664,8 @@
         </p:nvCxnSpPr>
         <p:spPr>
           <a:xfrm flipV="1">
-            <a:off x="4044000" y="1513170"/>
-            <a:ext cx="950388" cy="1629212"/>
+            <a:off x="7568646" y="3786313"/>
+            <a:ext cx="534593" cy="916432"/>
           </a:xfrm>
           <a:prstGeom prst="line">
             <a:avLst/>
@@ -4068,8 +3707,8 @@
         </p:nvCxnSpPr>
         <p:spPr>
           <a:xfrm flipH="1" flipV="1">
-            <a:off x="7197612" y="1513170"/>
-            <a:ext cx="950388" cy="1629212"/>
+            <a:off x="9342552" y="3786313"/>
+            <a:ext cx="534593" cy="916432"/>
           </a:xfrm>
           <a:prstGeom prst="line">
             <a:avLst/>
@@ -4111,8 +3750,8 @@
         </p:nvCxnSpPr>
         <p:spPr>
           <a:xfrm flipH="1">
-            <a:off x="4994388" y="1109348"/>
-            <a:ext cx="965458" cy="403822"/>
+            <a:off x="8103238" y="3559163"/>
+            <a:ext cx="543070" cy="227150"/>
           </a:xfrm>
           <a:prstGeom prst="line">
             <a:avLst/>
@@ -4154,8 +3793,8 @@
         </p:nvCxnSpPr>
         <p:spPr>
           <a:xfrm>
-            <a:off x="5351793" y="255289"/>
-            <a:ext cx="592983" cy="854059"/>
+            <a:off x="8304281" y="3078756"/>
+            <a:ext cx="333553" cy="480408"/>
           </a:xfrm>
           <a:prstGeom prst="line">
             <a:avLst/>
@@ -4197,8 +3836,8 @@
         </p:nvCxnSpPr>
         <p:spPr>
           <a:xfrm>
-            <a:off x="5351793" y="255289"/>
-            <a:ext cx="1473346" cy="0"/>
+            <a:off x="8304280" y="3078755"/>
+            <a:ext cx="828757" cy="0"/>
           </a:xfrm>
           <a:prstGeom prst="line">
             <a:avLst/>
@@ -4240,8 +3879,8 @@
         </p:nvCxnSpPr>
         <p:spPr>
           <a:xfrm>
-            <a:off x="6227512" y="1109348"/>
-            <a:ext cx="965458" cy="403822"/>
+            <a:off x="8796871" y="3559163"/>
+            <a:ext cx="543070" cy="227150"/>
           </a:xfrm>
           <a:prstGeom prst="line">
             <a:avLst/>
@@ -4283,8 +3922,8 @@
         </p:nvCxnSpPr>
         <p:spPr>
           <a:xfrm flipH="1">
-            <a:off x="6232156" y="255289"/>
-            <a:ext cx="592983" cy="854059"/>
+            <a:off x="8799484" y="3078756"/>
+            <a:ext cx="333553" cy="480408"/>
           </a:xfrm>
           <a:prstGeom prst="line">
             <a:avLst/>
@@ -4324,8 +3963,8 @@
         </p:nvCxnSpPr>
         <p:spPr>
           <a:xfrm>
-            <a:off x="4205177" y="3694814"/>
-            <a:ext cx="0" cy="2966484"/>
+            <a:off x="7659307" y="5013489"/>
+            <a:ext cx="0" cy="1668647"/>
           </a:xfrm>
           <a:prstGeom prst="line">
             <a:avLst/>
@@ -4365,8 +4004,8 @@
         </p:nvCxnSpPr>
         <p:spPr>
           <a:xfrm>
-            <a:off x="4360412" y="3694814"/>
-            <a:ext cx="0" cy="2966484"/>
+            <a:off x="7746627" y="5013489"/>
+            <a:ext cx="0" cy="1668647"/>
           </a:xfrm>
           <a:prstGeom prst="line">
             <a:avLst/>
@@ -4406,8 +4045,8 @@
         </p:nvCxnSpPr>
         <p:spPr>
           <a:xfrm>
-            <a:off x="4502889" y="3694814"/>
-            <a:ext cx="0" cy="2966484"/>
+            <a:off x="7826770" y="5013489"/>
+            <a:ext cx="0" cy="1668647"/>
           </a:xfrm>
           <a:prstGeom prst="line">
             <a:avLst/>
@@ -4447,8 +4086,8 @@
         </p:nvCxnSpPr>
         <p:spPr>
           <a:xfrm>
-            <a:off x="4636857" y="3694814"/>
-            <a:ext cx="0" cy="2966484"/>
+            <a:off x="7902127" y="5013489"/>
+            <a:ext cx="0" cy="1668647"/>
           </a:xfrm>
           <a:prstGeom prst="line">
             <a:avLst/>
@@ -4488,8 +4127,8 @@
         </p:nvSpPr>
         <p:spPr>
           <a:xfrm>
-            <a:off x="5255011" y="1551347"/>
-            <a:ext cx="97200" cy="97200"/>
+            <a:off x="8249839" y="3807788"/>
+            <a:ext cx="54675" cy="54675"/>
           </a:xfrm>
           <a:prstGeom prst="ellipse">
             <a:avLst/>
@@ -4522,7 +4161,7 @@
           <a:lstStyle/>
           <a:p>
             <a:pPr algn="ctr"/>
-            <a:endParaRPr lang="en-GB"/>
+            <a:endParaRPr lang="en-GB" sz="1013"/>
           </a:p>
         </p:txBody>
       </p:sp>
@@ -4540,8 +4179,8 @@
         </p:nvSpPr>
         <p:spPr>
           <a:xfrm>
-            <a:off x="5448575" y="1551347"/>
-            <a:ext cx="97200" cy="97200"/>
+            <a:off x="8358718" y="3807788"/>
+            <a:ext cx="54675" cy="54675"/>
           </a:xfrm>
           <a:prstGeom prst="ellipse">
             <a:avLst/>
@@ -4574,7 +4213,7 @@
           <a:lstStyle/>
           <a:p>
             <a:pPr algn="ctr"/>
-            <a:endParaRPr lang="en-GB"/>
+            <a:endParaRPr lang="en-GB" sz="1013"/>
           </a:p>
         </p:txBody>
       </p:sp>
@@ -4592,8 +4231,8 @@
         </p:nvSpPr>
         <p:spPr>
           <a:xfrm>
-            <a:off x="5642139" y="1551347"/>
-            <a:ext cx="97200" cy="97200"/>
+            <a:off x="8467599" y="3807788"/>
+            <a:ext cx="54675" cy="54675"/>
           </a:xfrm>
           <a:prstGeom prst="ellipse">
             <a:avLst/>
@@ -4626,7 +4265,7 @@
           <a:lstStyle/>
           <a:p>
             <a:pPr algn="ctr"/>
-            <a:endParaRPr lang="en-GB"/>
+            <a:endParaRPr lang="en-GB" sz="1013"/>
           </a:p>
         </p:txBody>
       </p:sp>
@@ -4644,8 +4283,8 @@
         </p:nvSpPr>
         <p:spPr>
           <a:xfrm>
-            <a:off x="5835703" y="1551347"/>
-            <a:ext cx="97200" cy="97200"/>
+            <a:off x="8576479" y="3807788"/>
+            <a:ext cx="54675" cy="54675"/>
           </a:xfrm>
           <a:prstGeom prst="ellipse">
             <a:avLst/>
@@ -4678,7 +4317,7 @@
           <a:lstStyle/>
           <a:p>
             <a:pPr algn="ctr"/>
-            <a:endParaRPr lang="en-GB"/>
+            <a:endParaRPr lang="en-GB" sz="1013"/>
           </a:p>
         </p:txBody>
       </p:sp>
@@ -4696,8 +4335,8 @@
         </p:nvSpPr>
         <p:spPr>
           <a:xfrm>
-            <a:off x="6029267" y="1551347"/>
-            <a:ext cx="97200" cy="97200"/>
+            <a:off x="8685358" y="3807788"/>
+            <a:ext cx="54675" cy="54675"/>
           </a:xfrm>
           <a:prstGeom prst="ellipse">
             <a:avLst/>
@@ -4730,7 +4369,7 @@
           <a:lstStyle/>
           <a:p>
             <a:pPr algn="ctr"/>
-            <a:endParaRPr lang="en-GB"/>
+            <a:endParaRPr lang="en-GB" sz="1013"/>
           </a:p>
         </p:txBody>
       </p:sp>
@@ -4748,8 +4387,8 @@
         </p:nvSpPr>
         <p:spPr>
           <a:xfrm>
-            <a:off x="6222831" y="1551347"/>
-            <a:ext cx="97200" cy="97200"/>
+            <a:off x="8794237" y="3807788"/>
+            <a:ext cx="54675" cy="54675"/>
           </a:xfrm>
           <a:prstGeom prst="ellipse">
             <a:avLst/>
@@ -4782,7 +4421,7 @@
           <a:lstStyle/>
           <a:p>
             <a:pPr algn="ctr"/>
-            <a:endParaRPr lang="en-GB"/>
+            <a:endParaRPr lang="en-GB" sz="1013"/>
           </a:p>
         </p:txBody>
       </p:sp>
@@ -4800,8 +4439,8 @@
         </p:nvSpPr>
         <p:spPr>
           <a:xfrm>
-            <a:off x="6416395" y="1551347"/>
-            <a:ext cx="97200" cy="97200"/>
+            <a:off x="8903118" y="3807788"/>
+            <a:ext cx="54675" cy="54675"/>
           </a:xfrm>
           <a:prstGeom prst="ellipse">
             <a:avLst/>
@@ -4834,7 +4473,7 @@
           <a:lstStyle/>
           <a:p>
             <a:pPr algn="ctr"/>
-            <a:endParaRPr lang="en-GB"/>
+            <a:endParaRPr lang="en-GB" sz="1013"/>
           </a:p>
         </p:txBody>
       </p:sp>
@@ -4852,8 +4491,8 @@
         </p:nvSpPr>
         <p:spPr>
           <a:xfrm>
-            <a:off x="6609959" y="1551347"/>
-            <a:ext cx="97200" cy="97200"/>
+            <a:off x="9011998" y="3807788"/>
+            <a:ext cx="54675" cy="54675"/>
           </a:xfrm>
           <a:prstGeom prst="ellipse">
             <a:avLst/>
@@ -4886,7 +4525,7 @@
           <a:lstStyle/>
           <a:p>
             <a:pPr algn="ctr"/>
-            <a:endParaRPr lang="en-GB"/>
+            <a:endParaRPr lang="en-GB" sz="1013"/>
           </a:p>
         </p:txBody>
       </p:sp>
@@ -4904,8 +4543,8 @@
         </p:nvSpPr>
         <p:spPr>
           <a:xfrm>
-            <a:off x="6803523" y="1551347"/>
-            <a:ext cx="97200" cy="97200"/>
+            <a:off x="9120877" y="3807788"/>
+            <a:ext cx="54675" cy="54675"/>
           </a:xfrm>
           <a:prstGeom prst="ellipse">
             <a:avLst/>
@@ -4938,7 +4577,7 @@
           <a:lstStyle/>
           <a:p>
             <a:pPr algn="ctr"/>
-            <a:endParaRPr lang="en-GB"/>
+            <a:endParaRPr lang="en-GB" sz="1013"/>
           </a:p>
         </p:txBody>
       </p:sp>
@@ -4958,7 +4597,7 @@
 <file path=ppt/theme/theme1.xml><?xml version="1.0" encoding="utf-8"?>
 <a:theme xmlns:a="http://schemas.openxmlformats.org/drawingml/2006/main" name="Office Theme">
   <a:themeElements>
-    <a:clrScheme name="Office">
+    <a:clrScheme name="Office Theme">
       <a:dk1>
         <a:sysClr val="windowText" lastClr="000000"/>
       </a:dk1>
@@ -4996,7 +4635,7 @@
         <a:srgbClr val="954F72"/>
       </a:folHlink>
     </a:clrScheme>
-    <a:fontScheme name="Office">
+    <a:fontScheme name="Office Theme">
       <a:majorFont>
         <a:latin typeface="Calibri Light" panose="020F0302020204030204"/>
         <a:ea typeface=""/>
@@ -5031,23 +4670,6 @@
         <a:font script="Viet" typeface="Times New Roman"/>
         <a:font script="Uigh" typeface="Microsoft Uighur"/>
         <a:font script="Geor" typeface="Sylfaen"/>
-        <a:font script="Armn" typeface="Arial"/>
-        <a:font script="Bugi" typeface="Leelawadee UI"/>
-        <a:font script="Bopo" typeface="Microsoft JhengHei"/>
-        <a:font script="Java" typeface="Javanese Text"/>
-        <a:font script="Lisu" typeface="Segoe UI"/>
-        <a:font script="Mymr" typeface="Myanmar Text"/>
-        <a:font script="Nkoo" typeface="Ebrima"/>
-        <a:font script="Olck" typeface="Nirmala UI"/>
-        <a:font script="Osma" typeface="Ebrima"/>
-        <a:font script="Phag" typeface="Phagspa"/>
-        <a:font script="Syrn" typeface="Estrangelo Edessa"/>
-        <a:font script="Syrj" typeface="Estrangelo Edessa"/>
-        <a:font script="Syre" typeface="Estrangelo Edessa"/>
-        <a:font script="Sora" typeface="Nirmala UI"/>
-        <a:font script="Tale" typeface="Microsoft Tai Le"/>
-        <a:font script="Talu" typeface="Microsoft New Tai Lue"/>
-        <a:font script="Tfng" typeface="Ebrima"/>
       </a:majorFont>
       <a:minorFont>
         <a:latin typeface="Calibri" panose="020F0502020204030204"/>
@@ -5083,26 +4705,9 @@
         <a:font script="Viet" typeface="Arial"/>
         <a:font script="Uigh" typeface="Microsoft Uighur"/>
         <a:font script="Geor" typeface="Sylfaen"/>
-        <a:font script="Armn" typeface="Arial"/>
-        <a:font script="Bugi" typeface="Leelawadee UI"/>
-        <a:font script="Bopo" typeface="Microsoft JhengHei"/>
-        <a:font script="Java" typeface="Javanese Text"/>
-        <a:font script="Lisu" typeface="Segoe UI"/>
-        <a:font script="Mymr" typeface="Myanmar Text"/>
-        <a:font script="Nkoo" typeface="Ebrima"/>
-        <a:font script="Olck" typeface="Nirmala UI"/>
-        <a:font script="Osma" typeface="Ebrima"/>
-        <a:font script="Phag" typeface="Phagspa"/>
-        <a:font script="Syrn" typeface="Estrangelo Edessa"/>
-        <a:font script="Syrj" typeface="Estrangelo Edessa"/>
-        <a:font script="Syre" typeface="Estrangelo Edessa"/>
-        <a:font script="Sora" typeface="Nirmala UI"/>
-        <a:font script="Tale" typeface="Microsoft Tai Le"/>
-        <a:font script="Talu" typeface="Microsoft New Tai Lue"/>
-        <a:font script="Tfng" typeface="Ebrima"/>
       </a:minorFont>
     </a:fontScheme>
-    <a:fmtScheme name="Office">
+    <a:fmtScheme name="Office Theme">
       <a:fillStyleLst>
         <a:solidFill>
           <a:schemeClr val="phClr"/>

</xml_diff>